<commit_message>
updated YANG-Push slides for NETCONF and NMOP
</commit_message>
<xml_diff>
--- a/120/NMOP/draft-ietf-nmop-yang-message-broker-integration.pptx
+++ b/120/NMOP/draft-ietf-nmop-yang-message-broker-integration.pptx
@@ -5,7 +5,7 @@
     <p:sldMasterId id="2147483648" r:id="rId1"/>
   </p:sldMasterIdLst>
   <p:notesMasterIdLst>
-    <p:notesMasterId r:id="rId23"/>
+    <p:notesMasterId r:id="rId24"/>
   </p:notesMasterIdLst>
   <p:sldIdLst>
     <p:sldId id="1041" r:id="rId2"/>
@@ -20,15 +20,16 @@
     <p:sldId id="2145706261" r:id="rId11"/>
     <p:sldId id="2145706246" r:id="rId12"/>
     <p:sldId id="2145706257" r:id="rId13"/>
-    <p:sldId id="2145706249" r:id="rId14"/>
-    <p:sldId id="2145706250" r:id="rId15"/>
-    <p:sldId id="2145706251" r:id="rId16"/>
-    <p:sldId id="2145706248" r:id="rId17"/>
-    <p:sldId id="2145706220" r:id="rId18"/>
-    <p:sldId id="2145706262" r:id="rId19"/>
-    <p:sldId id="2145706263" r:id="rId20"/>
-    <p:sldId id="2145706264" r:id="rId21"/>
-    <p:sldId id="2145706265" r:id="rId22"/>
+    <p:sldId id="2145706266" r:id="rId14"/>
+    <p:sldId id="2145706249" r:id="rId15"/>
+    <p:sldId id="2145706250" r:id="rId16"/>
+    <p:sldId id="2145706251" r:id="rId17"/>
+    <p:sldId id="2145706248" r:id="rId18"/>
+    <p:sldId id="2145706220" r:id="rId19"/>
+    <p:sldId id="2145706262" r:id="rId20"/>
+    <p:sldId id="2145706263" r:id="rId21"/>
+    <p:sldId id="2145706264" r:id="rId22"/>
+    <p:sldId id="2145706265" r:id="rId23"/>
   </p:sldIdLst>
   <p:sldSz cx="12192000" cy="6858000"/>
   <p:notesSz cx="6858000" cy="9144000"/>
@@ -135,6 +136,14 @@
 </p:presentation>
 </file>
 
+<file path=ppt/revisionInfo.xml><?xml version="1.0" encoding="utf-8"?>
+<p1510:revInfo xmlns:a="http://schemas.openxmlformats.org/drawingml/2006/main" xmlns:r="http://schemas.openxmlformats.org/officeDocument/2006/relationships" xmlns:p1510="http://schemas.microsoft.com/office/powerpoint/2015/10/main">
+  <p1510:revLst>
+    <p1510:client id="{48D6DBBB-A9B7-41ED-8971-0B7DF4441D17}" v="6" dt="2024-07-12T07:40:48.783"/>
+  </p1510:revLst>
+</p1510:revInfo>
+</file>
+
 <file path=ppt/changesInfos/changesInfo1.xml><?xml version="1.0" encoding="utf-8"?>
 <pc:chgInfo xmlns:a="http://schemas.openxmlformats.org/drawingml/2006/main" xmlns:r="http://schemas.openxmlformats.org/officeDocument/2006/relationships" xmlns:ac="http://schemas.microsoft.com/office/drawing/2013/main/command" xmlns:pc="http://schemas.microsoft.com/office/powerpoint/2013/main/command">
   <pc:docChgLst>
@@ -193,13 +202,13 @@
   </pc:docChgLst>
   <pc:docChgLst>
     <pc:chgData name="Graf Thomas, INI-NET-VNC-HCS" userId="487bc3e3-9ce7-4cdd-b7b4-8899ea88d289" providerId="ADAL" clId="{48D6DBBB-A9B7-41ED-8971-0B7DF4441D17}"/>
-    <pc:docChg chg="custSel modSld">
-      <pc:chgData name="Graf Thomas, INI-NET-VNC-HCS" userId="487bc3e3-9ce7-4cdd-b7b4-8899ea88d289" providerId="ADAL" clId="{48D6DBBB-A9B7-41ED-8971-0B7DF4441D17}" dt="2024-07-03T08:08:24.604" v="4" actId="478"/>
+    <pc:docChg chg="undo custSel addSld modSld sldOrd">
+      <pc:chgData name="Graf Thomas, INI-NET-VNC-HCS" userId="487bc3e3-9ce7-4cdd-b7b4-8899ea88d289" providerId="ADAL" clId="{48D6DBBB-A9B7-41ED-8971-0B7DF4441D17}" dt="2024-07-12T08:37:40.745" v="593" actId="20577"/>
       <pc:docMkLst>
         <pc:docMk/>
       </pc:docMkLst>
       <pc:sldChg chg="modSp mod">
-        <pc:chgData name="Graf Thomas, INI-NET-VNC-HCS" userId="487bc3e3-9ce7-4cdd-b7b4-8899ea88d289" providerId="ADAL" clId="{48D6DBBB-A9B7-41ED-8971-0B7DF4441D17}" dt="2024-07-03T08:07:47.115" v="3" actId="20577"/>
+        <pc:chgData name="Graf Thomas, INI-NET-VNC-HCS" userId="487bc3e3-9ce7-4cdd-b7b4-8899ea88d289" providerId="ADAL" clId="{48D6DBBB-A9B7-41ED-8971-0B7DF4441D17}" dt="2024-07-12T07:41:41.216" v="591" actId="20577"/>
         <pc:sldMkLst>
           <pc:docMk/>
           <pc:sldMk cId="3578665336" sldId="1041"/>
@@ -210,6 +219,44 @@
             <pc:docMk/>
             <pc:sldMk cId="3578665336" sldId="1041"/>
             <ac:spMk id="5" creationId="{C26208B2-0D10-4C23-B2DE-372A62E98644}"/>
+          </ac:spMkLst>
+        </pc:spChg>
+        <pc:spChg chg="mod">
+          <ac:chgData name="Graf Thomas, INI-NET-VNC-HCS" userId="487bc3e3-9ce7-4cdd-b7b4-8899ea88d289" providerId="ADAL" clId="{48D6DBBB-A9B7-41ED-8971-0B7DF4441D17}" dt="2024-07-12T07:41:41.216" v="591" actId="20577"/>
+          <ac:spMkLst>
+            <pc:docMk/>
+            <pc:sldMk cId="3578665336" sldId="1041"/>
+            <ac:spMk id="6" creationId="{6CAA0765-1318-4A03-8F91-D3ECC43D8FA7}"/>
+          </ac:spMkLst>
+        </pc:spChg>
+      </pc:sldChg>
+      <pc:sldChg chg="modSp mod">
+        <pc:chgData name="Graf Thomas, INI-NET-VNC-HCS" userId="487bc3e3-9ce7-4cdd-b7b4-8899ea88d289" providerId="ADAL" clId="{48D6DBBB-A9B7-41ED-8971-0B7DF4441D17}" dt="2024-07-12T08:37:18.806" v="592" actId="20577"/>
+        <pc:sldMkLst>
+          <pc:docMk/>
+          <pc:sldMk cId="1980732846" sldId="2145706229"/>
+        </pc:sldMkLst>
+        <pc:spChg chg="mod">
+          <ac:chgData name="Graf Thomas, INI-NET-VNC-HCS" userId="487bc3e3-9ce7-4cdd-b7b4-8899ea88d289" providerId="ADAL" clId="{48D6DBBB-A9B7-41ED-8971-0B7DF4441D17}" dt="2024-07-12T08:37:18.806" v="592" actId="20577"/>
+          <ac:spMkLst>
+            <pc:docMk/>
+            <pc:sldMk cId="1980732846" sldId="2145706229"/>
+            <ac:spMk id="3" creationId="{29C0DFD4-432D-4B0C-93DF-790441DCF5B9}"/>
+          </ac:spMkLst>
+        </pc:spChg>
+      </pc:sldChg>
+      <pc:sldChg chg="modSp mod">
+        <pc:chgData name="Graf Thomas, INI-NET-VNC-HCS" userId="487bc3e3-9ce7-4cdd-b7b4-8899ea88d289" providerId="ADAL" clId="{48D6DBBB-A9B7-41ED-8971-0B7DF4441D17}" dt="2024-07-12T07:27:19.598" v="147" actId="20577"/>
+        <pc:sldMkLst>
+          <pc:docMk/>
+          <pc:sldMk cId="2325717052" sldId="2145706246"/>
+        </pc:sldMkLst>
+        <pc:spChg chg="mod">
+          <ac:chgData name="Graf Thomas, INI-NET-VNC-HCS" userId="487bc3e3-9ce7-4cdd-b7b4-8899ea88d289" providerId="ADAL" clId="{48D6DBBB-A9B7-41ED-8971-0B7DF4441D17}" dt="2024-07-12T07:27:19.598" v="147" actId="20577"/>
+          <ac:spMkLst>
+            <pc:docMk/>
+            <pc:sldMk cId="2325717052" sldId="2145706246"/>
+            <ac:spMk id="2" creationId="{A2A6719D-B9BE-6230-EF0C-2923835A8199}"/>
           </ac:spMkLst>
         </pc:spChg>
       </pc:sldChg>
@@ -260,6 +307,21 @@
         </pc:spChg>
       </pc:sldChg>
       <pc:sldChg chg="modSp mod">
+        <pc:chgData name="Graf Thomas, INI-NET-VNC-HCS" userId="487bc3e3-9ce7-4cdd-b7b4-8899ea88d289" providerId="ADAL" clId="{48D6DBBB-A9B7-41ED-8971-0B7DF4441D17}" dt="2024-07-12T08:37:40.745" v="593" actId="20577"/>
+        <pc:sldMkLst>
+          <pc:docMk/>
+          <pc:sldMk cId="1767383836" sldId="2145706263"/>
+        </pc:sldMkLst>
+        <pc:spChg chg="mod">
+          <ac:chgData name="Graf Thomas, INI-NET-VNC-HCS" userId="487bc3e3-9ce7-4cdd-b7b4-8899ea88d289" providerId="ADAL" clId="{48D6DBBB-A9B7-41ED-8971-0B7DF4441D17}" dt="2024-07-12T08:37:40.745" v="593" actId="20577"/>
+          <ac:spMkLst>
+            <pc:docMk/>
+            <pc:sldMk cId="1767383836" sldId="2145706263"/>
+            <ac:spMk id="2" creationId="{FF20F271-6F0D-4AC0-BB1D-F5C338165C13}"/>
+          </ac:spMkLst>
+        </pc:spChg>
+      </pc:sldChg>
+      <pc:sldChg chg="modSp mod">
         <pc:chgData name="Graf Thomas, INI-NET-VNC-HCS" userId="487bc3e3-9ce7-4cdd-b7b4-8899ea88d289" providerId="ADAL" clId="{48D6DBBB-A9B7-41ED-8971-0B7DF4441D17}" dt="2024-07-03T08:07:08.548" v="1" actId="20577"/>
         <pc:sldMkLst>
           <pc:docMk/>
@@ -281,6 +343,77 @@
             <ac:spMk id="3" creationId="{29C0DFD4-432D-4B0C-93DF-790441DCF5B9}"/>
           </ac:spMkLst>
         </pc:spChg>
+      </pc:sldChg>
+      <pc:sldChg chg="addSp delSp modSp add mod ord">
+        <pc:chgData name="Graf Thomas, INI-NET-VNC-HCS" userId="487bc3e3-9ce7-4cdd-b7b4-8899ea88d289" providerId="ADAL" clId="{48D6DBBB-A9B7-41ED-8971-0B7DF4441D17}" dt="2024-07-12T07:41:20.297" v="585"/>
+        <pc:sldMkLst>
+          <pc:docMk/>
+          <pc:sldMk cId="1336863920" sldId="2145706266"/>
+        </pc:sldMkLst>
+        <pc:spChg chg="add mod">
+          <ac:chgData name="Graf Thomas, INI-NET-VNC-HCS" userId="487bc3e3-9ce7-4cdd-b7b4-8899ea88d289" providerId="ADAL" clId="{48D6DBBB-A9B7-41ED-8971-0B7DF4441D17}" dt="2024-07-12T07:41:20.297" v="585"/>
+          <ac:spMkLst>
+            <pc:docMk/>
+            <pc:sldMk cId="1336863920" sldId="2145706266"/>
+            <ac:spMk id="15" creationId="{81CF2E6B-29BB-3B8F-A4FD-C8E8A73C2282}"/>
+          </ac:spMkLst>
+        </pc:spChg>
+        <pc:picChg chg="del">
+          <ac:chgData name="Graf Thomas, INI-NET-VNC-HCS" userId="487bc3e3-9ce7-4cdd-b7b4-8899ea88d289" providerId="ADAL" clId="{48D6DBBB-A9B7-41ED-8971-0B7DF4441D17}" dt="2024-07-12T07:29:42.718" v="151" actId="478"/>
+          <ac:picMkLst>
+            <pc:docMk/>
+            <pc:sldMk cId="1336863920" sldId="2145706266"/>
+            <ac:picMk id="5" creationId="{107051E6-5C5B-3F57-3AC4-5FC80420DD88}"/>
+          </ac:picMkLst>
+        </pc:picChg>
+        <pc:cxnChg chg="add mod">
+          <ac:chgData name="Graf Thomas, INI-NET-VNC-HCS" userId="487bc3e3-9ce7-4cdd-b7b4-8899ea88d289" providerId="ADAL" clId="{48D6DBBB-A9B7-41ED-8971-0B7DF4441D17}" dt="2024-07-12T07:40:37.194" v="581" actId="692"/>
+          <ac:cxnSpMkLst>
+            <pc:docMk/>
+            <pc:sldMk cId="1336863920" sldId="2145706266"/>
+            <ac:cxnSpMk id="7" creationId="{83D1F104-0557-6EDA-760C-077B5A18DE98}"/>
+          </ac:cxnSpMkLst>
+        </pc:cxnChg>
+        <pc:cxnChg chg="add mod">
+          <ac:chgData name="Graf Thomas, INI-NET-VNC-HCS" userId="487bc3e3-9ce7-4cdd-b7b4-8899ea88d289" providerId="ADAL" clId="{48D6DBBB-A9B7-41ED-8971-0B7DF4441D17}" dt="2024-07-12T07:40:37.194" v="581" actId="692"/>
+          <ac:cxnSpMkLst>
+            <pc:docMk/>
+            <pc:sldMk cId="1336863920" sldId="2145706266"/>
+            <ac:cxnSpMk id="8" creationId="{A9F78903-BA21-F9F1-17B7-8DE3FB96072C}"/>
+          </ac:cxnSpMkLst>
+        </pc:cxnChg>
+        <pc:cxnChg chg="add mod">
+          <ac:chgData name="Graf Thomas, INI-NET-VNC-HCS" userId="487bc3e3-9ce7-4cdd-b7b4-8899ea88d289" providerId="ADAL" clId="{48D6DBBB-A9B7-41ED-8971-0B7DF4441D17}" dt="2024-07-12T07:40:37.194" v="581" actId="692"/>
+          <ac:cxnSpMkLst>
+            <pc:docMk/>
+            <pc:sldMk cId="1336863920" sldId="2145706266"/>
+            <ac:cxnSpMk id="10" creationId="{012D5E84-A66D-A11B-4F94-5E8AB181E3F5}"/>
+          </ac:cxnSpMkLst>
+        </pc:cxnChg>
+        <pc:cxnChg chg="add mod">
+          <ac:chgData name="Graf Thomas, INI-NET-VNC-HCS" userId="487bc3e3-9ce7-4cdd-b7b4-8899ea88d289" providerId="ADAL" clId="{48D6DBBB-A9B7-41ED-8971-0B7DF4441D17}" dt="2024-07-12T07:40:37.194" v="581" actId="692"/>
+          <ac:cxnSpMkLst>
+            <pc:docMk/>
+            <pc:sldMk cId="1336863920" sldId="2145706266"/>
+            <ac:cxnSpMk id="12" creationId="{203D64F1-8CC7-7EF0-8739-0387E0C463A0}"/>
+          </ac:cxnSpMkLst>
+        </pc:cxnChg>
+        <pc:cxnChg chg="add mod">
+          <ac:chgData name="Graf Thomas, INI-NET-VNC-HCS" userId="487bc3e3-9ce7-4cdd-b7b4-8899ea88d289" providerId="ADAL" clId="{48D6DBBB-A9B7-41ED-8971-0B7DF4441D17}" dt="2024-07-12T07:40:37.194" v="581" actId="692"/>
+          <ac:cxnSpMkLst>
+            <pc:docMk/>
+            <pc:sldMk cId="1336863920" sldId="2145706266"/>
+            <ac:cxnSpMk id="13" creationId="{A55AE0AF-510C-910F-E4AC-8ADE75D1ED34}"/>
+          </ac:cxnSpMkLst>
+        </pc:cxnChg>
+        <pc:cxnChg chg="add mod">
+          <ac:chgData name="Graf Thomas, INI-NET-VNC-HCS" userId="487bc3e3-9ce7-4cdd-b7b4-8899ea88d289" providerId="ADAL" clId="{48D6DBBB-A9B7-41ED-8971-0B7DF4441D17}" dt="2024-07-12T07:40:52.476" v="583" actId="1076"/>
+          <ac:cxnSpMkLst>
+            <pc:docMk/>
+            <pc:sldMk cId="1336863920" sldId="2145706266"/>
+            <ac:cxnSpMk id="21" creationId="{DCC108B7-3175-A51B-346A-B1C4613E8455}"/>
+          </ac:cxnSpMkLst>
+        </pc:cxnChg>
       </pc:sldChg>
     </pc:docChg>
   </pc:docChgLst>
@@ -369,7 +502,7 @@
           <a:p>
             <a:fld id="{E5E705E9-673F-4AC4-B29E-A7B26F3B8523}" type="datetimeFigureOut">
               <a:rPr lang="de-CH" smtClean="0"/>
-              <a:t>03.07.2024</a:t>
+              <a:t>12.07.2024</a:t>
             </a:fld>
             <a:endParaRPr lang="de-CH"/>
           </a:p>
@@ -795,7 +928,7 @@
     </p:spTree>
     <p:extLst>
       <p:ext uri="{BB962C8B-B14F-4D97-AF65-F5344CB8AC3E}">
-        <p14:creationId xmlns:p14="http://schemas.microsoft.com/office/powerpoint/2010/main" val="4247772086"/>
+        <p14:creationId xmlns:p14="http://schemas.microsoft.com/office/powerpoint/2010/main" val="1833883986"/>
       </p:ext>
     </p:extLst>
   </p:cSld>
@@ -871,6 +1004,90 @@
             <a:fld id="{2BBC52A0-2F3F-497F-8536-39D60282E9C2}" type="slidenum">
               <a:rPr lang="de-CH" smtClean="0"/>
               <a:t>21</a:t>
+            </a:fld>
+            <a:endParaRPr lang="de-CH"/>
+          </a:p>
+        </p:txBody>
+      </p:sp>
+    </p:spTree>
+    <p:extLst>
+      <p:ext uri="{BB962C8B-B14F-4D97-AF65-F5344CB8AC3E}">
+        <p14:creationId xmlns:p14="http://schemas.microsoft.com/office/powerpoint/2010/main" val="4247772086"/>
+      </p:ext>
+    </p:extLst>
+  </p:cSld>
+  <p:clrMapOvr>
+    <a:masterClrMapping/>
+  </p:clrMapOvr>
+</p:notes>
+</file>
+
+<file path=ppt/notesSlides/notesSlide12.xml><?xml version="1.0" encoding="utf-8"?>
+<p:notes xmlns:a="http://schemas.openxmlformats.org/drawingml/2006/main" xmlns:r="http://schemas.openxmlformats.org/officeDocument/2006/relationships" xmlns:p="http://schemas.openxmlformats.org/presentationml/2006/main">
+  <p:cSld>
+    <p:spTree>
+      <p:nvGrpSpPr>
+        <p:cNvPr id="1" name=""/>
+        <p:cNvGrpSpPr/>
+        <p:nvPr/>
+      </p:nvGrpSpPr>
+      <p:grpSpPr>
+        <a:xfrm>
+          <a:off x="0" y="0"/>
+          <a:ext cx="0" cy="0"/>
+          <a:chOff x="0" y="0"/>
+          <a:chExt cx="0" cy="0"/>
+        </a:xfrm>
+      </p:grpSpPr>
+      <p:sp>
+        <p:nvSpPr>
+          <p:cNvPr id="2" name="Slide Image Placeholder 1"/>
+          <p:cNvSpPr>
+            <a:spLocks noGrp="1" noRot="1" noChangeAspect="1"/>
+          </p:cNvSpPr>
+          <p:nvPr>
+            <p:ph type="sldImg"/>
+          </p:nvPr>
+        </p:nvSpPr>
+        <p:spPr/>
+      </p:sp>
+      <p:sp>
+        <p:nvSpPr>
+          <p:cNvPr id="3" name="Notes Placeholder 2"/>
+          <p:cNvSpPr>
+            <a:spLocks noGrp="1"/>
+          </p:cNvSpPr>
+          <p:nvPr>
+            <p:ph type="body" idx="1"/>
+          </p:nvPr>
+        </p:nvSpPr>
+        <p:spPr/>
+        <p:txBody>
+          <a:bodyPr/>
+          <a:lstStyle/>
+          <a:p>
+            <a:endParaRPr lang="de-CH" dirty="0"/>
+          </a:p>
+        </p:txBody>
+      </p:sp>
+      <p:sp>
+        <p:nvSpPr>
+          <p:cNvPr id="4" name="Slide Number Placeholder 3"/>
+          <p:cNvSpPr>
+            <a:spLocks noGrp="1"/>
+          </p:cNvSpPr>
+          <p:nvPr>
+            <p:ph type="sldNum" sz="quarter" idx="5"/>
+          </p:nvPr>
+        </p:nvSpPr>
+        <p:spPr/>
+        <p:txBody>
+          <a:bodyPr/>
+          <a:lstStyle/>
+          <a:p>
+            <a:fld id="{2BBC52A0-2F3F-497F-8536-39D60282E9C2}" type="slidenum">
+              <a:rPr lang="de-CH" smtClean="0"/>
+              <a:t>22</a:t>
             </a:fld>
             <a:endParaRPr lang="de-CH"/>
           </a:p>
@@ -1328,6 +1545,90 @@
       </p:grpSpPr>
       <p:sp>
         <p:nvSpPr>
+          <p:cNvPr id="2" name="Slide Image Placeholder 1"/>
+          <p:cNvSpPr>
+            <a:spLocks noGrp="1" noRot="1" noChangeAspect="1"/>
+          </p:cNvSpPr>
+          <p:nvPr>
+            <p:ph type="sldImg"/>
+          </p:nvPr>
+        </p:nvSpPr>
+        <p:spPr/>
+      </p:sp>
+      <p:sp>
+        <p:nvSpPr>
+          <p:cNvPr id="3" name="Notes Placeholder 2"/>
+          <p:cNvSpPr>
+            <a:spLocks noGrp="1"/>
+          </p:cNvSpPr>
+          <p:nvPr>
+            <p:ph type="body" idx="1"/>
+          </p:nvPr>
+        </p:nvSpPr>
+        <p:spPr/>
+        <p:txBody>
+          <a:bodyPr/>
+          <a:lstStyle/>
+          <a:p>
+            <a:endParaRPr lang="de-CH" dirty="0"/>
+          </a:p>
+        </p:txBody>
+      </p:sp>
+      <p:sp>
+        <p:nvSpPr>
+          <p:cNvPr id="4" name="Slide Number Placeholder 3"/>
+          <p:cNvSpPr>
+            <a:spLocks noGrp="1"/>
+          </p:cNvSpPr>
+          <p:nvPr>
+            <p:ph type="sldNum" sz="quarter" idx="5"/>
+          </p:nvPr>
+        </p:nvSpPr>
+        <p:spPr/>
+        <p:txBody>
+          <a:bodyPr/>
+          <a:lstStyle/>
+          <a:p>
+            <a:fld id="{2BBC52A0-2F3F-497F-8536-39D60282E9C2}" type="slidenum">
+              <a:rPr lang="de-CH" smtClean="0"/>
+              <a:t>13</a:t>
+            </a:fld>
+            <a:endParaRPr lang="de-CH"/>
+          </a:p>
+        </p:txBody>
+      </p:sp>
+    </p:spTree>
+    <p:extLst>
+      <p:ext uri="{BB962C8B-B14F-4D97-AF65-F5344CB8AC3E}">
+        <p14:creationId xmlns:p14="http://schemas.microsoft.com/office/powerpoint/2010/main" val="2275890051"/>
+      </p:ext>
+    </p:extLst>
+  </p:cSld>
+  <p:clrMapOvr>
+    <a:masterClrMapping/>
+  </p:clrMapOvr>
+</p:notes>
+</file>
+
+<file path=ppt/notesSlides/notesSlide8.xml><?xml version="1.0" encoding="utf-8"?>
+<p:notes xmlns:a="http://schemas.openxmlformats.org/drawingml/2006/main" xmlns:r="http://schemas.openxmlformats.org/officeDocument/2006/relationships" xmlns:p="http://schemas.openxmlformats.org/presentationml/2006/main">
+  <p:cSld>
+    <p:spTree>
+      <p:nvGrpSpPr>
+        <p:cNvPr id="1" name=""/>
+        <p:cNvGrpSpPr/>
+        <p:nvPr/>
+      </p:nvGrpSpPr>
+      <p:grpSpPr>
+        <a:xfrm>
+          <a:off x="0" y="0"/>
+          <a:ext cx="0" cy="0"/>
+          <a:chOff x="0" y="0"/>
+          <a:chExt cx="0" cy="0"/>
+        </a:xfrm>
+      </p:grpSpPr>
+      <p:sp>
+        <p:nvSpPr>
           <p:cNvPr id="2" name="Folienbildplatzhalter 1"/>
           <p:cNvSpPr>
             <a:spLocks noGrp="1" noRot="1" noChangeAspect="1"/>
@@ -1379,7 +1680,7 @@
           <a:p>
             <a:fld id="{E5BBCCF6-F8A8-4C49-BF3D-CA1AA74CA975}" type="slidenum">
               <a:rPr lang="de-DE" sz="1000" smtClean="0"/>
-              <a:t>17</a:t>
+              <a:t>18</a:t>
             </a:fld>
             <a:endParaRPr lang="de-DE" sz="1000"/>
           </a:p>
@@ -1389,90 +1690,6 @@
     <p:extLst>
       <p:ext uri="{BB962C8B-B14F-4D97-AF65-F5344CB8AC3E}">
         <p14:creationId xmlns:p14="http://schemas.microsoft.com/office/powerpoint/2010/main" val="135297159"/>
-      </p:ext>
-    </p:extLst>
-  </p:cSld>
-  <p:clrMapOvr>
-    <a:masterClrMapping/>
-  </p:clrMapOvr>
-</p:notes>
-</file>
-
-<file path=ppt/notesSlides/notesSlide8.xml><?xml version="1.0" encoding="utf-8"?>
-<p:notes xmlns:a="http://schemas.openxmlformats.org/drawingml/2006/main" xmlns:r="http://schemas.openxmlformats.org/officeDocument/2006/relationships" xmlns:p="http://schemas.openxmlformats.org/presentationml/2006/main">
-  <p:cSld>
-    <p:spTree>
-      <p:nvGrpSpPr>
-        <p:cNvPr id="1" name=""/>
-        <p:cNvGrpSpPr/>
-        <p:nvPr/>
-      </p:nvGrpSpPr>
-      <p:grpSpPr>
-        <a:xfrm>
-          <a:off x="0" y="0"/>
-          <a:ext cx="0" cy="0"/>
-          <a:chOff x="0" y="0"/>
-          <a:chExt cx="0" cy="0"/>
-        </a:xfrm>
-      </p:grpSpPr>
-      <p:sp>
-        <p:nvSpPr>
-          <p:cNvPr id="2" name="Slide Image Placeholder 1"/>
-          <p:cNvSpPr>
-            <a:spLocks noGrp="1" noRot="1" noChangeAspect="1"/>
-          </p:cNvSpPr>
-          <p:nvPr>
-            <p:ph type="sldImg"/>
-          </p:nvPr>
-        </p:nvSpPr>
-        <p:spPr/>
-      </p:sp>
-      <p:sp>
-        <p:nvSpPr>
-          <p:cNvPr id="3" name="Notes Placeholder 2"/>
-          <p:cNvSpPr>
-            <a:spLocks noGrp="1"/>
-          </p:cNvSpPr>
-          <p:nvPr>
-            <p:ph type="body" idx="1"/>
-          </p:nvPr>
-        </p:nvSpPr>
-        <p:spPr/>
-        <p:txBody>
-          <a:bodyPr/>
-          <a:lstStyle/>
-          <a:p>
-            <a:endParaRPr lang="de-CH" dirty="0"/>
-          </a:p>
-        </p:txBody>
-      </p:sp>
-      <p:sp>
-        <p:nvSpPr>
-          <p:cNvPr id="4" name="Slide Number Placeholder 3"/>
-          <p:cNvSpPr>
-            <a:spLocks noGrp="1"/>
-          </p:cNvSpPr>
-          <p:nvPr>
-            <p:ph type="sldNum" sz="quarter" idx="5"/>
-          </p:nvPr>
-        </p:nvSpPr>
-        <p:spPr/>
-        <p:txBody>
-          <a:bodyPr/>
-          <a:lstStyle/>
-          <a:p>
-            <a:fld id="{2BBC52A0-2F3F-497F-8536-39D60282E9C2}" type="slidenum">
-              <a:rPr lang="de-CH" smtClean="0"/>
-              <a:t>18</a:t>
-            </a:fld>
-            <a:endParaRPr lang="de-CH"/>
-          </a:p>
-        </p:txBody>
-      </p:sp>
-    </p:spTree>
-    <p:extLst>
-      <p:ext uri="{BB962C8B-B14F-4D97-AF65-F5344CB8AC3E}">
-        <p14:creationId xmlns:p14="http://schemas.microsoft.com/office/powerpoint/2010/main" val="2793986299"/>
       </p:ext>
     </p:extLst>
   </p:cSld>
@@ -1556,7 +1773,7 @@
     </p:spTree>
     <p:extLst>
       <p:ext uri="{BB962C8B-B14F-4D97-AF65-F5344CB8AC3E}">
-        <p14:creationId xmlns:p14="http://schemas.microsoft.com/office/powerpoint/2010/main" val="1833883986"/>
+        <p14:creationId xmlns:p14="http://schemas.microsoft.com/office/powerpoint/2010/main" val="2793986299"/>
       </p:ext>
     </p:extLst>
   </p:cSld>
@@ -1715,7 +1932,7 @@
           <a:p>
             <a:fld id="{9E9B238C-2335-4007-98C9-471C02CC43B6}" type="datetimeFigureOut">
               <a:rPr lang="de-CH" smtClean="0"/>
-              <a:t>03.07.2024</a:t>
+              <a:t>12.07.2024</a:t>
             </a:fld>
             <a:endParaRPr lang="de-CH"/>
           </a:p>
@@ -1915,7 +2132,7 @@
           <a:p>
             <a:fld id="{9E9B238C-2335-4007-98C9-471C02CC43B6}" type="datetimeFigureOut">
               <a:rPr lang="de-CH" smtClean="0"/>
-              <a:t>03.07.2024</a:t>
+              <a:t>12.07.2024</a:t>
             </a:fld>
             <a:endParaRPr lang="de-CH"/>
           </a:p>
@@ -2125,7 +2342,7 @@
           <a:p>
             <a:fld id="{9E9B238C-2335-4007-98C9-471C02CC43B6}" type="datetimeFigureOut">
               <a:rPr lang="de-CH" smtClean="0"/>
-              <a:t>03.07.2024</a:t>
+              <a:t>12.07.2024</a:t>
             </a:fld>
             <a:endParaRPr lang="de-CH"/>
           </a:p>
@@ -3567,7 +3784,7 @@
           <a:p>
             <a:fld id="{9E9B238C-2335-4007-98C9-471C02CC43B6}" type="datetimeFigureOut">
               <a:rPr lang="de-CH" smtClean="0"/>
-              <a:t>03.07.2024</a:t>
+              <a:t>12.07.2024</a:t>
             </a:fld>
             <a:endParaRPr lang="de-CH"/>
           </a:p>
@@ -3843,7 +4060,7 @@
           <a:p>
             <a:fld id="{9E9B238C-2335-4007-98C9-471C02CC43B6}" type="datetimeFigureOut">
               <a:rPr lang="de-CH" smtClean="0"/>
-              <a:t>03.07.2024</a:t>
+              <a:t>12.07.2024</a:t>
             </a:fld>
             <a:endParaRPr lang="de-CH"/>
           </a:p>
@@ -4111,7 +4328,7 @@
           <a:p>
             <a:fld id="{9E9B238C-2335-4007-98C9-471C02CC43B6}" type="datetimeFigureOut">
               <a:rPr lang="de-CH" smtClean="0"/>
-              <a:t>03.07.2024</a:t>
+              <a:t>12.07.2024</a:t>
             </a:fld>
             <a:endParaRPr lang="de-CH"/>
           </a:p>
@@ -4526,7 +4743,7 @@
           <a:p>
             <a:fld id="{9E9B238C-2335-4007-98C9-471C02CC43B6}" type="datetimeFigureOut">
               <a:rPr lang="de-CH" smtClean="0"/>
-              <a:t>03.07.2024</a:t>
+              <a:t>12.07.2024</a:t>
             </a:fld>
             <a:endParaRPr lang="de-CH"/>
           </a:p>
@@ -4668,7 +4885,7 @@
           <a:p>
             <a:fld id="{9E9B238C-2335-4007-98C9-471C02CC43B6}" type="datetimeFigureOut">
               <a:rPr lang="de-CH" smtClean="0"/>
-              <a:t>03.07.2024</a:t>
+              <a:t>12.07.2024</a:t>
             </a:fld>
             <a:endParaRPr lang="de-CH"/>
           </a:p>
@@ -4781,7 +4998,7 @@
           <a:p>
             <a:fld id="{9E9B238C-2335-4007-98C9-471C02CC43B6}" type="datetimeFigureOut">
               <a:rPr lang="de-CH" smtClean="0"/>
-              <a:t>03.07.2024</a:t>
+              <a:t>12.07.2024</a:t>
             </a:fld>
             <a:endParaRPr lang="de-CH"/>
           </a:p>
@@ -5094,7 +5311,7 @@
           <a:p>
             <a:fld id="{9E9B238C-2335-4007-98C9-471C02CC43B6}" type="datetimeFigureOut">
               <a:rPr lang="de-CH" smtClean="0"/>
-              <a:t>03.07.2024</a:t>
+              <a:t>12.07.2024</a:t>
             </a:fld>
             <a:endParaRPr lang="de-CH"/>
           </a:p>
@@ -5383,7 +5600,7 @@
           <a:p>
             <a:fld id="{9E9B238C-2335-4007-98C9-471C02CC43B6}" type="datetimeFigureOut">
               <a:rPr lang="de-CH" smtClean="0"/>
-              <a:t>03.07.2024</a:t>
+              <a:t>12.07.2024</a:t>
             </a:fld>
             <a:endParaRPr lang="de-CH"/>
           </a:p>
@@ -5626,7 +5843,7 @@
           <a:p>
             <a:fld id="{9E9B238C-2335-4007-98C9-471C02CC43B6}" type="datetimeFigureOut">
               <a:rPr lang="de-CH" smtClean="0"/>
-              <a:t>03.07.2024</a:t>
+              <a:t>12.07.2024</a:t>
             </a:fld>
             <a:endParaRPr lang="de-CH"/>
           </a:p>
@@ -6423,7 +6640,19 @@
               <a:rPr lang="de-CH" sz="1400" dirty="0">
                 <a:latin typeface="+mj-lt"/>
               </a:rPr>
-              <a:t>16. June </a:t>
+              <a:t>12. </a:t>
+            </a:r>
+            <a:r>
+              <a:rPr lang="de-CH" sz="1400" dirty="0" err="1">
+                <a:latin typeface="+mj-lt"/>
+              </a:rPr>
+              <a:t>July</a:t>
+            </a:r>
+            <a:r>
+              <a:rPr lang="de-CH" sz="1400" dirty="0">
+                <a:latin typeface="+mj-lt"/>
+              </a:rPr>
+              <a:t> </a:t>
             </a:r>
             <a:r>
               <a:rPr lang="de-CH" sz="1400" dirty="0">
@@ -9503,6 +9732,30 @@
               <a:t>.</a:t>
             </a:r>
           </a:p>
+          <a:p>
+            <a:pPr>
+              <a:buFont typeface="Wingdings" panose="05000000000000000000" pitchFamily="2" charset="2"/>
+              <a:buChar char="Ø"/>
+            </a:pPr>
+            <a:r>
+              <a:rPr lang="en-US" sz="1700" b="1" dirty="0">
+                <a:solidFill>
+                  <a:srgbClr val="FF0000"/>
+                </a:solidFill>
+              </a:rPr>
+              <a:t>Changes in -01: </a:t>
+            </a:r>
+            <a:r>
+              <a:rPr lang="en-US" sz="1700" dirty="0"/>
+              <a:t>Section 3.1 is now detailing the relationship to YANG-Push to Message Broker Integration architecture and how its being applied.</a:t>
+            </a:r>
+          </a:p>
+          <a:p>
+            <a:pPr marL="457200" lvl="1" indent="0">
+              <a:buNone/>
+            </a:pPr>
+            <a:endParaRPr lang="en-US" sz="1700" dirty="0"/>
+          </a:p>
         </p:txBody>
       </p:sp>
     </p:spTree>
@@ -11758,6 +12011,717 @@
       </p:grpSpPr>
       <p:sp>
         <p:nvSpPr>
+          <p:cNvPr id="2" name="Title 1">
+            <a:extLst>
+              <a:ext uri="{FF2B5EF4-FFF2-40B4-BE49-F238E27FC236}">
+                <a16:creationId xmlns:a16="http://schemas.microsoft.com/office/drawing/2014/main" id="{FF20F271-6F0D-4AC0-BB1D-F5C338165C13}"/>
+              </a:ext>
+            </a:extLst>
+          </p:cNvPr>
+          <p:cNvSpPr>
+            <a:spLocks noGrp="1"/>
+          </p:cNvSpPr>
+          <p:nvPr>
+            <p:ph type="title"/>
+          </p:nvPr>
+        </p:nvSpPr>
+        <p:spPr/>
+        <p:txBody>
+          <a:bodyPr>
+            <a:normAutofit/>
+          </a:bodyPr>
+          <a:lstStyle/>
+          <a:p>
+            <a:r>
+              <a:rPr lang="en-US" sz="2800" b="1" dirty="0"/>
+              <a:t>Address YANG Specification and Integration Gaps</a:t>
+            </a:r>
+            <a:br>
+              <a:rPr lang="en-GB" sz="3600" dirty="0"/>
+            </a:br>
+            <a:r>
+              <a:rPr lang="en-US" sz="2700" dirty="0">
+                <a:solidFill>
+                  <a:schemeClr val="bg2">
+                    <a:lumMod val="75000"/>
+                  </a:schemeClr>
+                </a:solidFill>
+              </a:rPr>
+              <a:t>Aiming for an automated data processing pipeline</a:t>
+            </a:r>
+          </a:p>
+        </p:txBody>
+      </p:sp>
+      <p:sp>
+        <p:nvSpPr>
+          <p:cNvPr id="3" name="Content Placeholder 2">
+            <a:extLst>
+              <a:ext uri="{FF2B5EF4-FFF2-40B4-BE49-F238E27FC236}">
+                <a16:creationId xmlns:a16="http://schemas.microsoft.com/office/drawing/2014/main" id="{29C0DFD4-432D-4B0C-93DF-790441DCF5B9}"/>
+              </a:ext>
+            </a:extLst>
+          </p:cNvPr>
+          <p:cNvSpPr>
+            <a:spLocks noGrp="1"/>
+          </p:cNvSpPr>
+          <p:nvPr>
+            <p:ph idx="1"/>
+          </p:nvPr>
+        </p:nvSpPr>
+        <p:spPr>
+          <a:xfrm>
+            <a:off x="838199" y="1690688"/>
+            <a:ext cx="8239299" cy="4486275"/>
+          </a:xfrm>
+        </p:spPr>
+        <p:txBody>
+          <a:bodyPr>
+            <a:noAutofit/>
+          </a:bodyPr>
+          <a:lstStyle/>
+          <a:p>
+            <a:pPr marL="0" indent="0">
+              <a:buNone/>
+            </a:pPr>
+            <a:r>
+              <a:rPr lang="en-US" sz="2000" b="1" dirty="0"/>
+              <a:t>YANG Specifications Gaps:</a:t>
+            </a:r>
+            <a:endParaRPr lang="en-US" sz="2000" dirty="0"/>
+          </a:p>
+          <a:p>
+            <a:r>
+              <a:rPr lang="en-US" sz="1900" dirty="0"/>
+              <a:t>YANG model for NETCONF Event Notifications</a:t>
+            </a:r>
+            <a:br>
+              <a:rPr lang="en-US" sz="1900" dirty="0"/>
+            </a:br>
+            <a:r>
+              <a:rPr lang="en-US" sz="1900" dirty="0">
+                <a:ea typeface="Times New Roman" panose="02020603050405020304" pitchFamily="18" charset="0"/>
+                <a:hlinkClick r:id="rId3"/>
+              </a:rPr>
+              <a:t>draft-</a:t>
+            </a:r>
+            <a:r>
+              <a:rPr lang="en-US" sz="1900" dirty="0" err="1">
+                <a:ea typeface="Times New Roman" panose="02020603050405020304" pitchFamily="18" charset="0"/>
+                <a:hlinkClick r:id="rId3"/>
+              </a:rPr>
+              <a:t>ahuang</a:t>
+            </a:r>
+            <a:r>
+              <a:rPr lang="en-US" sz="1900" dirty="0">
+                <a:ea typeface="Times New Roman" panose="02020603050405020304" pitchFamily="18" charset="0"/>
+                <a:hlinkClick r:id="rId3"/>
+              </a:rPr>
+              <a:t>-netconf-</a:t>
+            </a:r>
+            <a:r>
+              <a:rPr lang="en-US" sz="1900" dirty="0" err="1">
+                <a:ea typeface="Times New Roman" panose="02020603050405020304" pitchFamily="18" charset="0"/>
+                <a:hlinkClick r:id="rId3"/>
+              </a:rPr>
+              <a:t>notif</a:t>
+            </a:r>
+            <a:r>
+              <a:rPr lang="en-US" sz="1900" dirty="0">
+                <a:ea typeface="Times New Roman" panose="02020603050405020304" pitchFamily="18" charset="0"/>
+                <a:hlinkClick r:id="rId3"/>
+              </a:rPr>
+              <a:t>-yang</a:t>
+            </a:r>
+            <a:endParaRPr lang="en-US" sz="1900" dirty="0"/>
+          </a:p>
+          <a:p>
+            <a:r>
+              <a:rPr lang="en-US" sz="1900" dirty="0"/>
+              <a:t>Validating </a:t>
+            </a:r>
+            <a:r>
+              <a:rPr lang="en-US" sz="1900" dirty="0" err="1"/>
+              <a:t>anydata</a:t>
+            </a:r>
+            <a:r>
+              <a:rPr lang="en-US" sz="1900" dirty="0"/>
+              <a:t> in YANG Library context</a:t>
+            </a:r>
+            <a:br>
+              <a:rPr lang="en-US" sz="1900" dirty="0"/>
+            </a:br>
+            <a:r>
+              <a:rPr lang="en-US" sz="1900" dirty="0">
+                <a:hlinkClick r:id="rId4"/>
+              </a:rPr>
+              <a:t>draft-</a:t>
+            </a:r>
+            <a:r>
+              <a:rPr lang="en-US" sz="1900" dirty="0" err="1">
+                <a:hlinkClick r:id="rId4"/>
+              </a:rPr>
+              <a:t>aelhassany</a:t>
+            </a:r>
+            <a:r>
+              <a:rPr lang="en-US" sz="1900" dirty="0">
+                <a:hlinkClick r:id="rId4"/>
+              </a:rPr>
+              <a:t>-</a:t>
+            </a:r>
+            <a:r>
+              <a:rPr lang="en-US" sz="1900" dirty="0" err="1">
+                <a:hlinkClick r:id="rId4"/>
+              </a:rPr>
+              <a:t>anydata</a:t>
+            </a:r>
+            <a:r>
+              <a:rPr lang="en-US" sz="1900" dirty="0">
+                <a:hlinkClick r:id="rId4"/>
+              </a:rPr>
+              <a:t>-validation</a:t>
+            </a:r>
+            <a:endParaRPr lang="en-US" sz="1900" b="1" dirty="0">
+              <a:solidFill>
+                <a:srgbClr val="FF0000"/>
+              </a:solidFill>
+            </a:endParaRPr>
+          </a:p>
+          <a:p>
+            <a:pPr marL="0" indent="0">
+              <a:spcBef>
+                <a:spcPts val="1800"/>
+              </a:spcBef>
+              <a:buNone/>
+            </a:pPr>
+            <a:r>
+              <a:rPr lang="en-US" sz="2000" b="1" dirty="0"/>
+              <a:t>YANG Integration Gaps:</a:t>
+            </a:r>
+          </a:p>
+          <a:p>
+            <a:r>
+              <a:rPr lang="en-US" sz="1900" dirty="0"/>
+              <a:t>Support of Network Observation Timestamping in YANG Notifications</a:t>
+            </a:r>
+            <a:br>
+              <a:rPr lang="en-US" sz="1900" dirty="0"/>
+            </a:br>
+            <a:r>
+              <a:rPr lang="en-US" sz="1900" dirty="0">
+                <a:hlinkClick r:id="rId5"/>
+              </a:rPr>
+              <a:t>draft-</a:t>
+            </a:r>
+            <a:r>
+              <a:rPr lang="en-US" sz="1900" dirty="0" err="1">
+                <a:hlinkClick r:id="rId5"/>
+              </a:rPr>
+              <a:t>tgraf</a:t>
+            </a:r>
+            <a:r>
+              <a:rPr lang="en-US" sz="1900" dirty="0">
+                <a:hlinkClick r:id="rId5"/>
+              </a:rPr>
+              <a:t>-netconf-yang-push-observation-time</a:t>
+            </a:r>
+            <a:endParaRPr lang="en-US" sz="1900" dirty="0"/>
+          </a:p>
+          <a:p>
+            <a:r>
+              <a:rPr lang="en-US" sz="1900" dirty="0"/>
+              <a:t>Support of Hostname and Sequencing in YANG Notifications</a:t>
+            </a:r>
+            <a:br>
+              <a:rPr lang="en-US" sz="1900" dirty="0"/>
+            </a:br>
+            <a:r>
+              <a:rPr lang="en-US" sz="1900" dirty="0">
+                <a:hlinkClick r:id="rId6"/>
+              </a:rPr>
+              <a:t>draft-</a:t>
+            </a:r>
+            <a:r>
+              <a:rPr lang="en-US" sz="1900" dirty="0" err="1">
+                <a:hlinkClick r:id="rId6"/>
+              </a:rPr>
+              <a:t>tgraf</a:t>
+            </a:r>
+            <a:r>
+              <a:rPr lang="en-US" sz="1900" dirty="0">
+                <a:hlinkClick r:id="rId6"/>
+              </a:rPr>
+              <a:t>-netconf-</a:t>
+            </a:r>
+            <a:r>
+              <a:rPr lang="en-US" sz="1900" dirty="0" err="1">
+                <a:hlinkClick r:id="rId6"/>
+              </a:rPr>
+              <a:t>notif</a:t>
+            </a:r>
+            <a:r>
+              <a:rPr lang="en-US" sz="1900" dirty="0">
+                <a:hlinkClick r:id="rId6"/>
+              </a:rPr>
+              <a:t>-sequencing</a:t>
+            </a:r>
+            <a:endParaRPr lang="en-US" sz="1900" dirty="0"/>
+          </a:p>
+          <a:p>
+            <a:r>
+              <a:rPr lang="en-US" sz="1900" dirty="0"/>
+              <a:t>Support of Versioning in YANG Notifications Subscription</a:t>
+            </a:r>
+            <a:br>
+              <a:rPr lang="en-US" sz="1900" dirty="0"/>
+            </a:br>
+            <a:r>
+              <a:rPr lang="en-US" sz="1900" dirty="0">
+                <a:hlinkClick r:id="rId7"/>
+              </a:rPr>
+              <a:t>draft-</a:t>
+            </a:r>
+            <a:r>
+              <a:rPr lang="en-US" sz="1900" dirty="0" err="1">
+                <a:hlinkClick r:id="rId7"/>
+              </a:rPr>
+              <a:t>ietf</a:t>
+            </a:r>
+            <a:r>
+              <a:rPr lang="en-US" sz="1900" dirty="0">
+                <a:hlinkClick r:id="rId7"/>
+              </a:rPr>
+              <a:t>-netconf-yang-notifications-versioning</a:t>
+            </a:r>
+            <a:endParaRPr lang="en-US" sz="1900" dirty="0"/>
+          </a:p>
+          <a:p>
+            <a:r>
+              <a:rPr lang="en-US" sz="1900" dirty="0"/>
+              <a:t>Augmented-by Addition into the IETF-YANG-Library</a:t>
+            </a:r>
+            <a:br>
+              <a:rPr lang="en-US" sz="1900" dirty="0"/>
+            </a:br>
+            <a:r>
+              <a:rPr lang="en-US" sz="1900" dirty="0">
+                <a:hlinkClick r:id="rId8"/>
+              </a:rPr>
+              <a:t>draft-</a:t>
+            </a:r>
+            <a:r>
+              <a:rPr lang="en-US" sz="1900" dirty="0" err="1">
+                <a:hlinkClick r:id="rId8"/>
+              </a:rPr>
+              <a:t>lincla</a:t>
+            </a:r>
+            <a:r>
+              <a:rPr lang="en-US" sz="1900" dirty="0">
+                <a:hlinkClick r:id="rId8"/>
+              </a:rPr>
+              <a:t>-netconf-yang-library-augmentation</a:t>
+            </a:r>
+            <a:endParaRPr lang="en-US" sz="1900" dirty="0"/>
+          </a:p>
+        </p:txBody>
+      </p:sp>
+      <p:sp>
+        <p:nvSpPr>
+          <p:cNvPr id="6" name="Slide Number Placeholder 1">
+            <a:extLst>
+              <a:ext uri="{FF2B5EF4-FFF2-40B4-BE49-F238E27FC236}">
+                <a16:creationId xmlns:a16="http://schemas.microsoft.com/office/drawing/2014/main" id="{3D5EE238-429C-4784-8E42-1813EF45704D}"/>
+              </a:ext>
+            </a:extLst>
+          </p:cNvPr>
+          <p:cNvSpPr>
+            <a:spLocks noGrp="1"/>
+          </p:cNvSpPr>
+          <p:nvPr>
+            <p:ph type="sldNum" sz="quarter" idx="12"/>
+          </p:nvPr>
+        </p:nvSpPr>
+        <p:spPr>
+          <a:xfrm>
+            <a:off x="11587892" y="6361637"/>
+            <a:ext cx="414251" cy="365125"/>
+          </a:xfrm>
+        </p:spPr>
+        <p:txBody>
+          <a:bodyPr/>
+          <a:lstStyle/>
+          <a:p>
+            <a:fld id="{FC4AC485-25DE-431E-B345-9C0A15BB7F8A}" type="slidenum">
+              <a:rPr lang="de-CH" sz="1400" smtClean="0"/>
+              <a:t>13</a:t>
+            </a:fld>
+            <a:endParaRPr lang="de-CH" sz="1400" dirty="0"/>
+          </a:p>
+        </p:txBody>
+      </p:sp>
+      <p:cxnSp>
+        <p:nvCxnSpPr>
+          <p:cNvPr id="7" name="Straight Arrow Connector 6">
+            <a:extLst>
+              <a:ext uri="{FF2B5EF4-FFF2-40B4-BE49-F238E27FC236}">
+                <a16:creationId xmlns:a16="http://schemas.microsoft.com/office/drawing/2014/main" id="{83D1F104-0557-6EDA-760C-077B5A18DE98}"/>
+              </a:ext>
+            </a:extLst>
+          </p:cNvPr>
+          <p:cNvCxnSpPr>
+            <a:cxnSpLocks/>
+          </p:cNvCxnSpPr>
+          <p:nvPr/>
+        </p:nvCxnSpPr>
+        <p:spPr>
+          <a:xfrm>
+            <a:off x="4823927" y="2537927"/>
+            <a:ext cx="3480318" cy="0"/>
+          </a:xfrm>
+          <a:prstGeom prst="straightConnector1">
+            <a:avLst/>
+          </a:prstGeom>
+          <a:ln w="25400">
+            <a:solidFill>
+              <a:srgbClr val="FF0000"/>
+            </a:solidFill>
+            <a:prstDash val="sysDash"/>
+            <a:tailEnd type="stealth" w="lg" len="lg"/>
+          </a:ln>
+        </p:spPr>
+        <p:style>
+          <a:lnRef idx="1">
+            <a:schemeClr val="accent1"/>
+          </a:lnRef>
+          <a:fillRef idx="0">
+            <a:schemeClr val="accent1"/>
+          </a:fillRef>
+          <a:effectRef idx="0">
+            <a:schemeClr val="accent1"/>
+          </a:effectRef>
+          <a:fontRef idx="minor">
+            <a:schemeClr val="tx1"/>
+          </a:fontRef>
+        </p:style>
+      </p:cxnSp>
+      <p:cxnSp>
+        <p:nvCxnSpPr>
+          <p:cNvPr id="8" name="Straight Arrow Connector 7">
+            <a:extLst>
+              <a:ext uri="{FF2B5EF4-FFF2-40B4-BE49-F238E27FC236}">
+                <a16:creationId xmlns:a16="http://schemas.microsoft.com/office/drawing/2014/main" id="{A9F78903-BA21-F9F1-17B7-8DE3FB96072C}"/>
+              </a:ext>
+            </a:extLst>
+          </p:cNvPr>
+          <p:cNvCxnSpPr>
+            <a:cxnSpLocks/>
+          </p:cNvCxnSpPr>
+          <p:nvPr/>
+        </p:nvCxnSpPr>
+        <p:spPr>
+          <a:xfrm>
+            <a:off x="5956042" y="4351176"/>
+            <a:ext cx="2348203" cy="0"/>
+          </a:xfrm>
+          <a:prstGeom prst="straightConnector1">
+            <a:avLst/>
+          </a:prstGeom>
+          <a:ln w="25400">
+            <a:solidFill>
+              <a:srgbClr val="FF0000"/>
+            </a:solidFill>
+            <a:prstDash val="sysDash"/>
+            <a:tailEnd type="stealth" w="lg" len="lg"/>
+          </a:ln>
+        </p:spPr>
+        <p:style>
+          <a:lnRef idx="1">
+            <a:schemeClr val="accent1"/>
+          </a:lnRef>
+          <a:fillRef idx="0">
+            <a:schemeClr val="accent1"/>
+          </a:fillRef>
+          <a:effectRef idx="0">
+            <a:schemeClr val="accent1"/>
+          </a:effectRef>
+          <a:fontRef idx="minor">
+            <a:schemeClr val="tx1"/>
+          </a:fontRef>
+        </p:style>
+      </p:cxnSp>
+      <p:cxnSp>
+        <p:nvCxnSpPr>
+          <p:cNvPr id="10" name="Straight Arrow Connector 9">
+            <a:extLst>
+              <a:ext uri="{FF2B5EF4-FFF2-40B4-BE49-F238E27FC236}">
+                <a16:creationId xmlns:a16="http://schemas.microsoft.com/office/drawing/2014/main" id="{012D5E84-A66D-A11B-4F94-5E8AB181E3F5}"/>
+              </a:ext>
+            </a:extLst>
+          </p:cNvPr>
+          <p:cNvCxnSpPr>
+            <a:cxnSpLocks/>
+          </p:cNvCxnSpPr>
+          <p:nvPr/>
+        </p:nvCxnSpPr>
+        <p:spPr>
+          <a:xfrm>
+            <a:off x="4823927" y="4988767"/>
+            <a:ext cx="3480318" cy="0"/>
+          </a:xfrm>
+          <a:prstGeom prst="straightConnector1">
+            <a:avLst/>
+          </a:prstGeom>
+          <a:ln w="25400">
+            <a:solidFill>
+              <a:srgbClr val="FF0000"/>
+            </a:solidFill>
+            <a:prstDash val="sysDash"/>
+            <a:tailEnd type="stealth" w="lg" len="lg"/>
+          </a:ln>
+        </p:spPr>
+        <p:style>
+          <a:lnRef idx="1">
+            <a:schemeClr val="accent1"/>
+          </a:lnRef>
+          <a:fillRef idx="0">
+            <a:schemeClr val="accent1"/>
+          </a:fillRef>
+          <a:effectRef idx="0">
+            <a:schemeClr val="accent1"/>
+          </a:effectRef>
+          <a:fontRef idx="minor">
+            <a:schemeClr val="tx1"/>
+          </a:fontRef>
+        </p:style>
+      </p:cxnSp>
+      <p:cxnSp>
+        <p:nvCxnSpPr>
+          <p:cNvPr id="12" name="Straight Arrow Connector 11">
+            <a:extLst>
+              <a:ext uri="{FF2B5EF4-FFF2-40B4-BE49-F238E27FC236}">
+                <a16:creationId xmlns:a16="http://schemas.microsoft.com/office/drawing/2014/main" id="{203D64F1-8CC7-7EF0-8739-0387E0C463A0}"/>
+              </a:ext>
+            </a:extLst>
+          </p:cNvPr>
+          <p:cNvCxnSpPr>
+            <a:cxnSpLocks/>
+          </p:cNvCxnSpPr>
+          <p:nvPr/>
+        </p:nvCxnSpPr>
+        <p:spPr>
+          <a:xfrm>
+            <a:off x="5956042" y="5632580"/>
+            <a:ext cx="2348203" cy="0"/>
+          </a:xfrm>
+          <a:prstGeom prst="straightConnector1">
+            <a:avLst/>
+          </a:prstGeom>
+          <a:ln w="25400">
+            <a:solidFill>
+              <a:srgbClr val="FF0000"/>
+            </a:solidFill>
+            <a:prstDash val="sysDash"/>
+            <a:tailEnd type="stealth" w="lg" len="lg"/>
+          </a:ln>
+        </p:spPr>
+        <p:style>
+          <a:lnRef idx="1">
+            <a:schemeClr val="accent1"/>
+          </a:lnRef>
+          <a:fillRef idx="0">
+            <a:schemeClr val="accent1"/>
+          </a:fillRef>
+          <a:effectRef idx="0">
+            <a:schemeClr val="accent1"/>
+          </a:effectRef>
+          <a:fontRef idx="minor">
+            <a:schemeClr val="tx1"/>
+          </a:fontRef>
+        </p:style>
+      </p:cxnSp>
+      <p:cxnSp>
+        <p:nvCxnSpPr>
+          <p:cNvPr id="13" name="Straight Arrow Connector 12">
+            <a:extLst>
+              <a:ext uri="{FF2B5EF4-FFF2-40B4-BE49-F238E27FC236}">
+                <a16:creationId xmlns:a16="http://schemas.microsoft.com/office/drawing/2014/main" id="{A55AE0AF-510C-910F-E4AC-8ADE75D1ED34}"/>
+              </a:ext>
+            </a:extLst>
+          </p:cNvPr>
+          <p:cNvCxnSpPr>
+            <a:cxnSpLocks/>
+          </p:cNvCxnSpPr>
+          <p:nvPr/>
+        </p:nvCxnSpPr>
+        <p:spPr>
+          <a:xfrm>
+            <a:off x="5828524" y="6248400"/>
+            <a:ext cx="2475721" cy="0"/>
+          </a:xfrm>
+          <a:prstGeom prst="straightConnector1">
+            <a:avLst/>
+          </a:prstGeom>
+          <a:ln w="25400">
+            <a:solidFill>
+              <a:srgbClr val="FF0000"/>
+            </a:solidFill>
+            <a:prstDash val="sysDash"/>
+            <a:tailEnd type="stealth" w="lg" len="lg"/>
+          </a:ln>
+        </p:spPr>
+        <p:style>
+          <a:lnRef idx="1">
+            <a:schemeClr val="accent1"/>
+          </a:lnRef>
+          <a:fillRef idx="0">
+            <a:schemeClr val="accent1"/>
+          </a:fillRef>
+          <a:effectRef idx="0">
+            <a:schemeClr val="accent1"/>
+          </a:effectRef>
+          <a:fontRef idx="minor">
+            <a:schemeClr val="tx1"/>
+          </a:fontRef>
+        </p:style>
+      </p:cxnSp>
+      <p:sp>
+        <p:nvSpPr>
+          <p:cNvPr id="15" name="TextBox 14">
+            <a:extLst>
+              <a:ext uri="{FF2B5EF4-FFF2-40B4-BE49-F238E27FC236}">
+                <a16:creationId xmlns:a16="http://schemas.microsoft.com/office/drawing/2014/main" id="{81CF2E6B-29BB-3B8F-A4FD-C8E8A73C2282}"/>
+              </a:ext>
+            </a:extLst>
+          </p:cNvPr>
+          <p:cNvSpPr txBox="1"/>
+          <p:nvPr/>
+        </p:nvSpPr>
+        <p:spPr>
+          <a:xfrm>
+            <a:off x="8611065" y="1139134"/>
+            <a:ext cx="3209168" cy="5093702"/>
+          </a:xfrm>
+          <a:prstGeom prst="rect">
+            <a:avLst/>
+          </a:prstGeom>
+          <a:noFill/>
+        </p:spPr>
+        <p:txBody>
+          <a:bodyPr wrap="square">
+            <a:spAutoFit/>
+          </a:bodyPr>
+          <a:lstStyle/>
+          <a:p>
+            <a:pPr algn="ctr"/>
+            <a:r>
+              <a:rPr lang="en-US" sz="2500" b="1" dirty="0">
+                <a:latin typeface="+mj-lt"/>
+              </a:rPr>
+              <a:t>« </a:t>
+            </a:r>
+            <a:r>
+              <a:rPr lang="en-US" sz="2500" dirty="0">
+                <a:latin typeface="+mj-lt"/>
+              </a:rPr>
+              <a:t>Do you recognize that addressing those gaps are a prerequisite to enable an automated data processing chain? If yes, </a:t>
+            </a:r>
+            <a:r>
+              <a:rPr lang="en-US" sz="2500" b="1" dirty="0">
+                <a:solidFill>
+                  <a:srgbClr val="FF0000"/>
+                </a:solidFill>
+                <a:latin typeface="+mj-lt"/>
+              </a:rPr>
+              <a:t>please consider to attend IETF 120 NETCONF working group session on Thursday 09:30 – 11:30 or go onto the mailing list and contribute to the discussion. </a:t>
+            </a:r>
+            <a:r>
+              <a:rPr lang="de-CH" sz="2500" b="1" dirty="0">
+                <a:latin typeface="+mj-lt"/>
+              </a:rPr>
+              <a:t>»</a:t>
+            </a:r>
+            <a:endParaRPr lang="en-US" sz="2500" b="1" dirty="0">
+              <a:latin typeface="+mj-lt"/>
+            </a:endParaRPr>
+          </a:p>
+        </p:txBody>
+      </p:sp>
+      <p:cxnSp>
+        <p:nvCxnSpPr>
+          <p:cNvPr id="21" name="Straight Arrow Connector 20">
+            <a:extLst>
+              <a:ext uri="{FF2B5EF4-FFF2-40B4-BE49-F238E27FC236}">
+                <a16:creationId xmlns:a16="http://schemas.microsoft.com/office/drawing/2014/main" id="{DCC108B7-3175-A51B-346A-B1C4613E8455}"/>
+              </a:ext>
+            </a:extLst>
+          </p:cNvPr>
+          <p:cNvCxnSpPr>
+            <a:cxnSpLocks/>
+          </p:cNvCxnSpPr>
+          <p:nvPr/>
+        </p:nvCxnSpPr>
+        <p:spPr>
+          <a:xfrm>
+            <a:off x="4823927" y="3218228"/>
+            <a:ext cx="3480318" cy="0"/>
+          </a:xfrm>
+          <a:prstGeom prst="straightConnector1">
+            <a:avLst/>
+          </a:prstGeom>
+          <a:ln w="25400">
+            <a:solidFill>
+              <a:srgbClr val="FF0000"/>
+            </a:solidFill>
+            <a:prstDash val="sysDash"/>
+            <a:tailEnd type="stealth" w="lg" len="lg"/>
+          </a:ln>
+        </p:spPr>
+        <p:style>
+          <a:lnRef idx="1">
+            <a:schemeClr val="accent1"/>
+          </a:lnRef>
+          <a:fillRef idx="0">
+            <a:schemeClr val="accent1"/>
+          </a:fillRef>
+          <a:effectRef idx="0">
+            <a:schemeClr val="accent1"/>
+          </a:effectRef>
+          <a:fontRef idx="minor">
+            <a:schemeClr val="tx1"/>
+          </a:fontRef>
+        </p:style>
+      </p:cxnSp>
+    </p:spTree>
+    <p:extLst>
+      <p:ext uri="{BB962C8B-B14F-4D97-AF65-F5344CB8AC3E}">
+        <p14:creationId xmlns:p14="http://schemas.microsoft.com/office/powerpoint/2010/main" val="1336863920"/>
+      </p:ext>
+    </p:extLst>
+  </p:cSld>
+  <p:clrMapOvr>
+    <a:masterClrMapping/>
+  </p:clrMapOvr>
+</p:sld>
+</file>
+
+<file path=ppt/slides/slide14.xml><?xml version="1.0" encoding="utf-8"?>
+<p:sld xmlns:a="http://schemas.openxmlformats.org/drawingml/2006/main" xmlns:r="http://schemas.openxmlformats.org/officeDocument/2006/relationships" xmlns:p="http://schemas.openxmlformats.org/presentationml/2006/main">
+  <p:cSld>
+    <p:spTree>
+      <p:nvGrpSpPr>
+        <p:cNvPr id="1" name=""/>
+        <p:cNvGrpSpPr/>
+        <p:nvPr/>
+      </p:nvGrpSpPr>
+      <p:grpSpPr>
+        <a:xfrm>
+          <a:off x="0" y="0"/>
+          <a:ext cx="0" cy="0"/>
+          <a:chOff x="0" y="0"/>
+          <a:chExt cx="0" cy="0"/>
+        </a:xfrm>
+      </p:grpSpPr>
+      <p:sp>
+        <p:nvSpPr>
           <p:cNvPr id="6" name="Slide Number Placeholder 1">
             <a:extLst>
               <a:ext uri="{FF2B5EF4-FFF2-40B4-BE49-F238E27FC236}">
@@ -11784,7 +12748,7 @@
           <a:p>
             <a:fld id="{FC4AC485-25DE-431E-B345-9C0A15BB7F8A}" type="slidenum">
               <a:rPr lang="de-CH" sz="1400" smtClean="0"/>
-              <a:t>13</a:t>
+              <a:t>14</a:t>
             </a:fld>
             <a:endParaRPr lang="de-CH" sz="1400" dirty="0"/>
           </a:p>
@@ -12250,7 +13214,7 @@
 </p:sld>
 </file>
 
-<file path=ppt/slides/slide14.xml><?xml version="1.0" encoding="utf-8"?>
+<file path=ppt/slides/slide15.xml><?xml version="1.0" encoding="utf-8"?>
 <p:sld xmlns:a="http://schemas.openxmlformats.org/drawingml/2006/main" xmlns:r="http://schemas.openxmlformats.org/officeDocument/2006/relationships" xmlns:p="http://schemas.openxmlformats.org/presentationml/2006/main">
   <p:cSld>
     <p:spTree>
@@ -12295,7 +13259,7 @@
           <a:p>
             <a:fld id="{FC4AC485-25DE-431E-B345-9C0A15BB7F8A}" type="slidenum">
               <a:rPr lang="de-CH" sz="1400" smtClean="0"/>
-              <a:t>14</a:t>
+              <a:t>15</a:t>
             </a:fld>
             <a:endParaRPr lang="de-CH" sz="1400" dirty="0"/>
           </a:p>
@@ -13031,7 +13995,7 @@
 </p:sld>
 </file>
 
-<file path=ppt/slides/slide15.xml><?xml version="1.0" encoding="utf-8"?>
+<file path=ppt/slides/slide16.xml><?xml version="1.0" encoding="utf-8"?>
 <p:sld xmlns:a="http://schemas.openxmlformats.org/drawingml/2006/main" xmlns:r="http://schemas.openxmlformats.org/officeDocument/2006/relationships" xmlns:p="http://schemas.openxmlformats.org/presentationml/2006/main">
   <p:cSld>
     <p:spTree>
@@ -13076,7 +14040,7 @@
           <a:p>
             <a:fld id="{FC4AC485-25DE-431E-B345-9C0A15BB7F8A}" type="slidenum">
               <a:rPr lang="de-CH" sz="1400" smtClean="0"/>
-              <a:t>15</a:t>
+              <a:t>16</a:t>
             </a:fld>
             <a:endParaRPr lang="de-CH" sz="1400" dirty="0"/>
           </a:p>
@@ -19561,7 +20525,7 @@
 </p:sld>
 </file>
 
-<file path=ppt/slides/slide16.xml><?xml version="1.0" encoding="utf-8"?>
+<file path=ppt/slides/slide17.xml><?xml version="1.0" encoding="utf-8"?>
 <p:sld xmlns:a="http://schemas.openxmlformats.org/drawingml/2006/main" xmlns:r="http://schemas.openxmlformats.org/officeDocument/2006/relationships" xmlns:p="http://schemas.openxmlformats.org/presentationml/2006/main">
   <p:cSld>
     <p:spTree>
@@ -19606,7 +20570,7 @@
           <a:p>
             <a:fld id="{FC4AC485-25DE-431E-B345-9C0A15BB7F8A}" type="slidenum">
               <a:rPr lang="de-CH" sz="1400" smtClean="0"/>
-              <a:t>16</a:t>
+              <a:t>17</a:t>
             </a:fld>
             <a:endParaRPr lang="de-CH" sz="1400" dirty="0"/>
           </a:p>
@@ -31461,7 +32425,7 @@
 </p:sld>
 </file>
 
-<file path=ppt/slides/slide17.xml><?xml version="1.0" encoding="utf-8"?>
+<file path=ppt/slides/slide18.xml><?xml version="1.0" encoding="utf-8"?>
 <p:sld xmlns:a="http://schemas.openxmlformats.org/drawingml/2006/main" xmlns:r="http://schemas.openxmlformats.org/officeDocument/2006/relationships" xmlns:p="http://schemas.openxmlformats.org/presentationml/2006/main">
   <p:cSld>
     <p:spTree>
@@ -31552,7 +32516,7 @@
                   <a:spcPts val="600"/>
                 </a:spcAft>
               </a:pPr>
-              <a:t>17</a:t>
+              <a:t>18</a:t>
             </a:fld>
             <a:endParaRPr lang="de-CH"/>
           </a:p>
@@ -31562,256 +32526,6 @@
     <p:extLst>
       <p:ext uri="{BB962C8B-B14F-4D97-AF65-F5344CB8AC3E}">
         <p14:creationId xmlns:p14="http://schemas.microsoft.com/office/powerpoint/2010/main" val="670772560"/>
-      </p:ext>
-    </p:extLst>
-  </p:cSld>
-  <p:clrMapOvr>
-    <a:masterClrMapping/>
-  </p:clrMapOvr>
-</p:sld>
-</file>
-
-<file path=ppt/slides/slide18.xml><?xml version="1.0" encoding="utf-8"?>
-<p:sld xmlns:a="http://schemas.openxmlformats.org/drawingml/2006/main" xmlns:r="http://schemas.openxmlformats.org/officeDocument/2006/relationships" xmlns:p="http://schemas.openxmlformats.org/presentationml/2006/main">
-  <p:cSld>
-    <p:spTree>
-      <p:nvGrpSpPr>
-        <p:cNvPr id="1" name=""/>
-        <p:cNvGrpSpPr/>
-        <p:nvPr/>
-      </p:nvGrpSpPr>
-      <p:grpSpPr>
-        <a:xfrm>
-          <a:off x="0" y="0"/>
-          <a:ext cx="0" cy="0"/>
-          <a:chOff x="0" y="0"/>
-          <a:chExt cx="0" cy="0"/>
-        </a:xfrm>
-      </p:grpSpPr>
-      <p:sp>
-        <p:nvSpPr>
-          <p:cNvPr id="2" name="Title 1">
-            <a:extLst>
-              <a:ext uri="{FF2B5EF4-FFF2-40B4-BE49-F238E27FC236}">
-                <a16:creationId xmlns:a16="http://schemas.microsoft.com/office/drawing/2014/main" id="{FF20F271-6F0D-4AC0-BB1D-F5C338165C13}"/>
-              </a:ext>
-            </a:extLst>
-          </p:cNvPr>
-          <p:cNvSpPr>
-            <a:spLocks noGrp="1"/>
-          </p:cNvSpPr>
-          <p:nvPr>
-            <p:ph type="title"/>
-          </p:nvPr>
-        </p:nvSpPr>
-        <p:spPr/>
-        <p:txBody>
-          <a:bodyPr>
-            <a:normAutofit/>
-          </a:bodyPr>
-          <a:lstStyle/>
-          <a:p>
-            <a:r>
-              <a:rPr lang="en-US" sz="2800" b="1" dirty="0">
-                <a:solidFill>
-                  <a:srgbClr val="FF0000"/>
-                </a:solidFill>
-              </a:rPr>
-              <a:t>YANG model </a:t>
-            </a:r>
-            <a:r>
-              <a:rPr lang="en-US" sz="2800" b="1" dirty="0"/>
-              <a:t>for NETCONF Event Notifications</a:t>
-            </a:r>
-            <a:br>
-              <a:rPr lang="en-US" sz="3200" dirty="0"/>
-            </a:br>
-            <a:r>
-              <a:rPr lang="en-US" sz="2400" dirty="0">
-                <a:solidFill>
-                  <a:schemeClr val="bg2">
-                    <a:lumMod val="75000"/>
-                  </a:schemeClr>
-                </a:solidFill>
-              </a:rPr>
-              <a:t>draft-ahuang-netconf-notif-yang-05  - Status and Next Steps</a:t>
-            </a:r>
-            <a:endParaRPr lang="en-US" sz="3100" dirty="0">
-              <a:solidFill>
-                <a:schemeClr val="bg2">
-                  <a:lumMod val="75000"/>
-                </a:schemeClr>
-              </a:solidFill>
-            </a:endParaRPr>
-          </a:p>
-        </p:txBody>
-      </p:sp>
-      <p:sp>
-        <p:nvSpPr>
-          <p:cNvPr id="3" name="Content Placeholder 2">
-            <a:extLst>
-              <a:ext uri="{FF2B5EF4-FFF2-40B4-BE49-F238E27FC236}">
-                <a16:creationId xmlns:a16="http://schemas.microsoft.com/office/drawing/2014/main" id="{29C0DFD4-432D-4B0C-93DF-790441DCF5B9}"/>
-              </a:ext>
-            </a:extLst>
-          </p:cNvPr>
-          <p:cNvSpPr>
-            <a:spLocks noGrp="1"/>
-          </p:cNvSpPr>
-          <p:nvPr>
-            <p:ph idx="1"/>
-          </p:nvPr>
-        </p:nvSpPr>
-        <p:spPr>
-          <a:xfrm>
-            <a:off x="838199" y="1810138"/>
-            <a:ext cx="10515599" cy="4441371"/>
-          </a:xfrm>
-        </p:spPr>
-        <p:txBody>
-          <a:bodyPr>
-            <a:noAutofit/>
-          </a:bodyPr>
-          <a:lstStyle/>
-          <a:p>
-            <a:pPr marL="0" indent="0">
-              <a:buNone/>
-            </a:pPr>
-            <a:r>
-              <a:rPr lang="en-US" sz="1700" b="1" dirty="0"/>
-              <a:t>Current Status</a:t>
-            </a:r>
-          </a:p>
-          <a:p>
-            <a:r>
-              <a:rPr lang="en-US" sz="1700" dirty="0"/>
-              <a:t>Push back from Mohamed Boucadair on -04 working group adoption call. </a:t>
-            </a:r>
-          </a:p>
-          <a:p>
-            <a:pPr>
-              <a:spcBef>
-                <a:spcPts val="600"/>
-              </a:spcBef>
-            </a:pPr>
-            <a:r>
-              <a:rPr lang="en-US" sz="1700" dirty="0"/>
-              <a:t>-05 addresses the following points:</a:t>
-            </a:r>
-          </a:p>
-          <a:p>
-            <a:pPr lvl="1">
-              <a:spcBef>
-                <a:spcPts val="600"/>
-              </a:spcBef>
-            </a:pPr>
-            <a:r>
-              <a:rPr lang="en-US" sz="1700" dirty="0"/>
-              <a:t>Document updates besides RFC 5277 now also RFC 8639, RFC 7951 and RFC 9254 since RFC 8639 applies the notification statement in YANG-Push and RFC 7951 and RFC 9254 misses the description how to encode the notification statement in JSON and CBOR. </a:t>
-            </a:r>
-          </a:p>
-          <a:p>
-            <a:pPr lvl="1">
-              <a:spcBef>
-                <a:spcPts val="600"/>
-              </a:spcBef>
-            </a:pPr>
-            <a:r>
-              <a:rPr lang="en-US" sz="1700" dirty="0"/>
-              <a:t>Describes the relationship to RFC 5277, RFC 8639, RFC 7951 and RFC 9254 and excludes scoping for </a:t>
-            </a:r>
-            <a:r>
-              <a:rPr lang="en-US" sz="1700" dirty="0" err="1"/>
-              <a:t>Restconf</a:t>
-            </a:r>
-            <a:r>
-              <a:rPr lang="en-US" sz="1700" dirty="0"/>
-              <a:t> since Section 6 of RFC 8040 describes encoding in JSON.</a:t>
-            </a:r>
-          </a:p>
-          <a:p>
-            <a:pPr lvl="1">
-              <a:spcBef>
-                <a:spcPts val="600"/>
-              </a:spcBef>
-            </a:pPr>
-            <a:r>
-              <a:rPr lang="en-US" sz="1700" dirty="0"/>
-              <a:t>Editorial changes such as examples are moved from the appendix to section 4.</a:t>
-            </a:r>
-          </a:p>
-          <a:p>
-            <a:pPr marL="0" indent="0">
-              <a:spcBef>
-                <a:spcPts val="1800"/>
-              </a:spcBef>
-              <a:buNone/>
-            </a:pPr>
-            <a:r>
-              <a:rPr lang="en-US" sz="1700" b="1" dirty="0"/>
-              <a:t>Next Steps</a:t>
-            </a:r>
-          </a:p>
-          <a:p>
-            <a:pPr>
-              <a:buFont typeface="Wingdings" panose="05000000000000000000" pitchFamily="2" charset="2"/>
-              <a:buChar char="Ø"/>
-            </a:pPr>
-            <a:r>
-              <a:rPr lang="en-US" sz="1700" b="1" dirty="0">
-                <a:solidFill>
-                  <a:srgbClr val="FF0000"/>
-                </a:solidFill>
-              </a:rPr>
-              <a:t>Requesting feedback from the netconf working group and YANG-Push implementers.</a:t>
-            </a:r>
-            <a:endParaRPr lang="en-US" sz="1800" dirty="0">
-              <a:solidFill>
-                <a:srgbClr val="FF0000"/>
-              </a:solidFill>
-              <a:ea typeface="Times New Roman" panose="02020603050405020304" pitchFamily="18" charset="0"/>
-            </a:endParaRPr>
-          </a:p>
-        </p:txBody>
-      </p:sp>
-      <p:sp>
-        <p:nvSpPr>
-          <p:cNvPr id="7" name="Slide Number Placeholder 1">
-            <a:extLst>
-              <a:ext uri="{FF2B5EF4-FFF2-40B4-BE49-F238E27FC236}">
-                <a16:creationId xmlns:a16="http://schemas.microsoft.com/office/drawing/2014/main" id="{431654D8-5CEC-4B8C-A548-2C0DECDF0A19}"/>
-              </a:ext>
-            </a:extLst>
-          </p:cNvPr>
-          <p:cNvSpPr>
-            <a:spLocks noGrp="1"/>
-          </p:cNvSpPr>
-          <p:nvPr>
-            <p:ph type="sldNum" sz="quarter" idx="12"/>
-          </p:nvPr>
-        </p:nvSpPr>
-        <p:spPr>
-          <a:xfrm>
-            <a:off x="11587892" y="6361637"/>
-            <a:ext cx="414251" cy="365125"/>
-          </a:xfrm>
-        </p:spPr>
-        <p:txBody>
-          <a:bodyPr/>
-          <a:lstStyle/>
-          <a:p>
-            <a:fld id="{FC4AC485-25DE-431E-B345-9C0A15BB7F8A}" type="slidenum">
-              <a:rPr lang="en-US" sz="1400" smtClean="0"/>
-              <a:t>18</a:t>
-            </a:fld>
-            <a:endParaRPr lang="en-US" sz="1400" dirty="0"/>
-          </a:p>
-        </p:txBody>
-      </p:sp>
-    </p:spTree>
-    <p:extLst>
-      <p:ext uri="{BB962C8B-B14F-4D97-AF65-F5344CB8AC3E}">
-        <p14:creationId xmlns:p14="http://schemas.microsoft.com/office/powerpoint/2010/main" val="2945280267"/>
       </p:ext>
     </p:extLst>
   </p:cSld>
@@ -31862,19 +32576,19 @@
           <a:lstStyle/>
           <a:p>
             <a:r>
-              <a:rPr lang="en-US" sz="2800" b="1" dirty="0"/>
-              <a:t>Extend Netconf Notifications with </a:t>
-            </a:r>
-            <a:r>
               <a:rPr lang="en-US" sz="2800" b="1" dirty="0">
                 <a:solidFill>
                   <a:srgbClr val="FF0000"/>
                 </a:solidFill>
               </a:rPr>
-              <a:t>Hostname and Sequence Number</a:t>
+              <a:t>YANG model </a:t>
+            </a:r>
+            <a:r>
+              <a:rPr lang="en-US" sz="2800" b="1" dirty="0"/>
+              <a:t>for NETCONF Event Notifications</a:t>
             </a:r>
             <a:br>
-              <a:rPr lang="en-GB" sz="3200" dirty="0"/>
+              <a:rPr lang="en-US" sz="3200" dirty="0"/>
             </a:br>
             <a:r>
               <a:rPr lang="en-US" sz="2400" dirty="0">
@@ -31884,27 +32598,7 @@
                   </a:schemeClr>
                 </a:solidFill>
               </a:rPr>
-              <a:t>draft-tgraf-netconf-notif-sequencing-05</a:t>
-            </a:r>
-            <a:r>
-              <a:rPr lang="en-GB" sz="2400" dirty="0">
-                <a:solidFill>
-                  <a:schemeClr val="bg2">
-                    <a:lumMod val="75000"/>
-                  </a:schemeClr>
-                </a:solidFill>
-              </a:rPr>
-              <a:t>  - </a:t>
-            </a:r>
-            <a:r>
-              <a:rPr lang="en-US" sz="2400" dirty="0">
-                <a:solidFill>
-                  <a:schemeClr val="bg2">
-                    <a:lumMod val="75000"/>
-                  </a:schemeClr>
-                </a:solidFill>
-              </a:rPr>
-              <a:t>Status and Next Steps</a:t>
+              <a:t>draft-ahuang-netconf-notif-yang-05  - Status and Next Steps</a:t>
             </a:r>
             <a:endParaRPr lang="en-US" sz="3100" dirty="0">
               <a:solidFill>
@@ -31955,21 +32649,7 @@
           <a:p>
             <a:r>
               <a:rPr lang="en-US" sz="1700" dirty="0"/>
-              <a:t>Addresses feedback at NMOP that notification changes should be discoverable.</a:t>
-            </a:r>
-          </a:p>
-          <a:p>
-            <a:pPr lvl="1"/>
-            <a:r>
-              <a:rPr lang="en-US" sz="1700" dirty="0"/>
-              <a:t>Section 2.1 describes new netconf notification with hostname and sequence capability. </a:t>
-            </a:r>
-          </a:p>
-          <a:p>
-            <a:pPr lvl="1"/>
-            <a:r>
-              <a:rPr lang="en-US" sz="1700" dirty="0"/>
-              <a:t>Section 2.2 describes new YANG-related system capabilities. Netconf notification with hostname and sequence capability is now discoverable through extended YANG-related system capabilities defined in RFC 9196.</a:t>
+              <a:t>Push back from Mohamed Boucadair on -04 working group adoption call. </a:t>
             </a:r>
           </a:p>
           <a:p>
@@ -31980,7 +32660,48 @@
             </a:pPr>
             <a:r>
               <a:rPr lang="en-US" sz="1700" dirty="0"/>
-              <a:t>Minor editorial changes and implementation status section added.</a:t>
+              <a:t>-05 addresses the following points:</a:t>
+            </a:r>
+          </a:p>
+          <a:p>
+            <a:pPr lvl="1">
+              <a:spcBef>
+                <a:spcPts val="600"/>
+              </a:spcBef>
+            </a:pPr>
+            <a:r>
+              <a:rPr lang="en-US" sz="1700" dirty="0"/>
+              <a:t>Document updates besides RFC 5277 now also RFC 8639, RFC 7951 and RFC 9254 since RFC 8639 applies the notification statement in YANG-Push and RFC 7951 and RFC 9254 misses the description how to encode the notification statement in JSON and CBOR. </a:t>
+            </a:r>
+          </a:p>
+          <a:p>
+            <a:pPr lvl="1">
+              <a:spcBef>
+                <a:spcPts val="600"/>
+              </a:spcBef>
+            </a:pPr>
+            <a:r>
+              <a:rPr lang="en-US" sz="1700" dirty="0"/>
+              <a:t>Describes the relationship to RFC 5277, RFC 8639, RFC 7951 and RFC 9254 and excludes scoping for </a:t>
+            </a:r>
+            <a:r>
+              <a:rPr lang="en-US" sz="1700" dirty="0" err="1"/>
+              <a:t>Restconf</a:t>
+            </a:r>
+            <a:r>
+              <a:rPr lang="en-US" sz="1700" dirty="0"/>
+              <a:t> since Section 6 of RFC 8040 describes encoding in JSON.</a:t>
+            </a:r>
+          </a:p>
+          <a:p>
+            <a:pPr lvl="1">
+              <a:spcBef>
+                <a:spcPts val="600"/>
+              </a:spcBef>
+            </a:pPr>
+            <a:r>
+              <a:rPr lang="en-US" sz="1700" dirty="0"/>
+              <a:t>Editorial changes such as examples are moved from the appendix to section 4.</a:t>
             </a:r>
           </a:p>
           <a:p>
@@ -32044,17 +32765,17 @@
           <a:lstStyle/>
           <a:p>
             <a:fld id="{FC4AC485-25DE-431E-B345-9C0A15BB7F8A}" type="slidenum">
-              <a:rPr lang="de-CH" sz="1400" smtClean="0"/>
+              <a:rPr lang="en-US" sz="1400" smtClean="0"/>
               <a:t>19</a:t>
             </a:fld>
-            <a:endParaRPr lang="de-CH" sz="1400" dirty="0"/>
+            <a:endParaRPr lang="en-US" sz="1400" dirty="0"/>
           </a:p>
         </p:txBody>
       </p:sp>
     </p:spTree>
     <p:extLst>
       <p:ext uri="{BB962C8B-B14F-4D97-AF65-F5344CB8AC3E}">
-        <p14:creationId xmlns:p14="http://schemas.microsoft.com/office/powerpoint/2010/main" val="1767383836"/>
+        <p14:creationId xmlns:p14="http://schemas.microsoft.com/office/powerpoint/2010/main" val="2945280267"/>
       </p:ext>
     </p:extLst>
   </p:cSld>
@@ -32576,7 +33297,7 @@
           <a:p>
             <a:r>
               <a:rPr lang="en-US" sz="2800" b="1" dirty="0"/>
-              <a:t>Extend YANG-Push Notifications with </a:t>
+              <a:t>Extend Netconf Notifications with </a:t>
             </a:r>
             <a:r>
               <a:rPr lang="en-US" sz="2800" b="1" dirty="0">
@@ -32584,7 +33305,7 @@
                   <a:srgbClr val="FF0000"/>
                 </a:solidFill>
               </a:rPr>
-              <a:t>Observation Timestamping</a:t>
+              <a:t>Hostname and Sequence Number</a:t>
             </a:r>
             <a:br>
               <a:rPr lang="en-GB" sz="3200" dirty="0"/>
@@ -32597,7 +33318,7 @@
                   </a:schemeClr>
                 </a:solidFill>
               </a:rPr>
-              <a:t>draft-tgraf-netconf-yang-push-observation-time-02</a:t>
+              <a:t>draft-tgraf-netconf-notif-sequencing-06</a:t>
             </a:r>
             <a:r>
               <a:rPr lang="en-GB" sz="2400" dirty="0">
@@ -32668,69 +33389,21 @@
           <a:p>
             <a:r>
               <a:rPr lang="en-US" sz="1700" dirty="0"/>
-              <a:t>Changed semantics:</a:t>
+              <a:t>Addresses feedback at NMOP that notification changes should be discoverable.</a:t>
             </a:r>
           </a:p>
           <a:p>
             <a:pPr lvl="1"/>
             <a:r>
               <a:rPr lang="en-US" sz="1700" dirty="0"/>
-              <a:t>One observation-time timestamp describing when the metric was observed eases end to end integration into streaming processor and time series database. </a:t>
+              <a:t>Section 2.1 describes new netconf notification with hostname and sequence capability. </a:t>
             </a:r>
           </a:p>
           <a:p>
             <a:pPr lvl="1"/>
             <a:r>
               <a:rPr lang="en-US" sz="1700" dirty="0"/>
-              <a:t>Point-in-time describes at which point in time the value of observation-time was observed.  </a:t>
-            </a:r>
-          </a:p>
-          <a:p>
-            <a:pPr lvl="2"/>
-            <a:r>
-              <a:rPr lang="en-US" sz="1700" dirty="0"/>
-              <a:t>For "periodical" subscription, the "current-accounting" describes the </a:t>
-            </a:r>
-            <a:r>
-              <a:rPr lang="en-US" sz="1700" b="1" dirty="0"/>
-              <a:t>point in time where the metrics were polled and observed</a:t>
-            </a:r>
-            <a:r>
-              <a:rPr lang="en-US" sz="1700" dirty="0"/>
-              <a:t>.  </a:t>
-            </a:r>
-          </a:p>
-          <a:p>
-            <a:pPr lvl="2"/>
-            <a:r>
-              <a:rPr lang="en-US" sz="1700" dirty="0"/>
-              <a:t>For "on-change" subscriptions, the value of point-in-time is </a:t>
-            </a:r>
-            <a:r>
-              <a:rPr lang="en-US" sz="1700" b="1" dirty="0"/>
-              <a:t>"state-changed", when the state change was observed in real-time.</a:t>
-            </a:r>
-          </a:p>
-          <a:p>
-            <a:pPr lvl="2"/>
-            <a:r>
-              <a:rPr lang="en-US" sz="1700" dirty="0"/>
-              <a:t>For "on-change" subscriptions with the "sync on start option", the value of point-in-time </a:t>
-            </a:r>
-            <a:r>
-              <a:rPr lang="en-US" sz="1700" b="1" dirty="0"/>
-              <a:t>for the initial state is "initial-state".</a:t>
-            </a:r>
-          </a:p>
-          <a:p>
-            <a:pPr>
-              <a:spcBef>
-                <a:spcPts val="600"/>
-              </a:spcBef>
-            </a:pPr>
-            <a:r>
-              <a:rPr lang="en-US" sz="1700" dirty="0"/>
-              <a:t>YANG-Push observation timestamping capability is now discoverable by extending YANG-related system capabilities defined in RFC 9196. </a:t>
+              <a:t>Section 2.2 describes new YANG-related system capabilities. Netconf notification with hostname and sequence capability is now discoverable through extended YANG-related system capabilities defined in RFC 9196.</a:t>
             </a:r>
           </a:p>
           <a:p>
@@ -32815,7 +33488,7 @@
     </p:spTree>
     <p:extLst>
       <p:ext uri="{BB962C8B-B14F-4D97-AF65-F5344CB8AC3E}">
-        <p14:creationId xmlns:p14="http://schemas.microsoft.com/office/powerpoint/2010/main" val="22946092"/>
+        <p14:creationId xmlns:p14="http://schemas.microsoft.com/office/powerpoint/2010/main" val="1767383836"/>
       </p:ext>
     </p:extLst>
   </p:cSld>
@@ -32867,7 +33540,7 @@
           <a:p>
             <a:r>
               <a:rPr lang="en-US" sz="2800" b="1" dirty="0"/>
-              <a:t>Support of </a:t>
+              <a:t>Extend YANG-Push Notifications with </a:t>
             </a:r>
             <a:r>
               <a:rPr lang="en-US" sz="2800" b="1" dirty="0">
@@ -32875,14 +33548,10 @@
                   <a:srgbClr val="FF0000"/>
                 </a:solidFill>
               </a:rPr>
-              <a:t>Versioning</a:t>
-            </a:r>
-            <a:r>
-              <a:rPr lang="en-US" sz="2800" b="1" dirty="0"/>
-              <a:t> in YANG Notifications Subscription</a:t>
+              <a:t>Observation Timestamping</a:t>
             </a:r>
             <a:br>
-              <a:rPr lang="en-US" sz="3200" dirty="0"/>
+              <a:rPr lang="en-GB" sz="3200" dirty="0"/>
             </a:br>
             <a:r>
               <a:rPr lang="en-US" sz="2400" dirty="0">
@@ -32892,7 +33561,27 @@
                   </a:schemeClr>
                 </a:solidFill>
               </a:rPr>
-              <a:t>draft-ietf-netconf-yang-notifications-versioning-04  - Status and Next Steps</a:t>
+              <a:t>draft-tgraf-netconf-yang-push-observation-time-02</a:t>
+            </a:r>
+            <a:r>
+              <a:rPr lang="en-GB" sz="2400" dirty="0">
+                <a:solidFill>
+                  <a:schemeClr val="bg2">
+                    <a:lumMod val="75000"/>
+                  </a:schemeClr>
+                </a:solidFill>
+              </a:rPr>
+              <a:t>  - </a:t>
+            </a:r>
+            <a:r>
+              <a:rPr lang="en-US" sz="2400" dirty="0">
+                <a:solidFill>
+                  <a:schemeClr val="bg2">
+                    <a:lumMod val="75000"/>
+                  </a:schemeClr>
+                </a:solidFill>
+              </a:rPr>
+              <a:t>Status and Next Steps</a:t>
             </a:r>
             <a:endParaRPr lang="en-US" sz="3100" dirty="0">
               <a:solidFill>
@@ -32943,13 +33632,80 @@
           <a:p>
             <a:r>
               <a:rPr lang="en-US" sz="1700" dirty="0"/>
-              <a:t>Resolved issue that within a "case" statement identifiers need to be unique. </a:t>
-            </a:r>
-          </a:p>
-          <a:p>
+              <a:t>Changed semantics:</a:t>
+            </a:r>
+          </a:p>
+          <a:p>
+            <a:pPr lvl="1"/>
             <a:r>
               <a:rPr lang="en-US" sz="1700" dirty="0"/>
-              <a:t>Thanks to Jérémie Leska from 6Wind for reporting this issue.</a:t>
+              <a:t>One observation-time timestamp describing when the metric was observed eases end to end integration into streaming processor and time series database. </a:t>
+            </a:r>
+          </a:p>
+          <a:p>
+            <a:pPr lvl="1"/>
+            <a:r>
+              <a:rPr lang="en-US" sz="1700" dirty="0"/>
+              <a:t>Point-in-time describes at which point in time the value of observation-time was observed.  </a:t>
+            </a:r>
+          </a:p>
+          <a:p>
+            <a:pPr lvl="2"/>
+            <a:r>
+              <a:rPr lang="en-US" sz="1700" dirty="0"/>
+              <a:t>For "periodical" subscription, the "current-accounting" describes the </a:t>
+            </a:r>
+            <a:r>
+              <a:rPr lang="en-US" sz="1700" b="1" dirty="0"/>
+              <a:t>point in time where the metrics were polled and observed</a:t>
+            </a:r>
+            <a:r>
+              <a:rPr lang="en-US" sz="1700" dirty="0"/>
+              <a:t>.  </a:t>
+            </a:r>
+          </a:p>
+          <a:p>
+            <a:pPr lvl="2"/>
+            <a:r>
+              <a:rPr lang="en-US" sz="1700" dirty="0"/>
+              <a:t>For "on-change" subscriptions, the value of point-in-time is </a:t>
+            </a:r>
+            <a:r>
+              <a:rPr lang="en-US" sz="1700" b="1" dirty="0"/>
+              <a:t>"state-changed", when the state change was observed in real-time.</a:t>
+            </a:r>
+          </a:p>
+          <a:p>
+            <a:pPr lvl="2"/>
+            <a:r>
+              <a:rPr lang="en-US" sz="1700" dirty="0"/>
+              <a:t>For "on-change" subscriptions with the "sync on start option", the value of point-in-time </a:t>
+            </a:r>
+            <a:r>
+              <a:rPr lang="en-US" sz="1700" b="1" dirty="0"/>
+              <a:t>for the initial state is "initial-state".</a:t>
+            </a:r>
+          </a:p>
+          <a:p>
+            <a:pPr>
+              <a:spcBef>
+                <a:spcPts val="600"/>
+              </a:spcBef>
+            </a:pPr>
+            <a:r>
+              <a:rPr lang="en-US" sz="1700" dirty="0"/>
+              <a:t>YANG-Push observation timestamping capability is now discoverable by extending YANG-related system capabilities defined in RFC 9196. </a:t>
+            </a:r>
+          </a:p>
+          <a:p>
+            <a:pPr>
+              <a:spcBef>
+                <a:spcPts val="600"/>
+              </a:spcBef>
+            </a:pPr>
+            <a:r>
+              <a:rPr lang="en-US" sz="1700" dirty="0"/>
+              <a:t>Minor editorial changes and implementation status section added.</a:t>
             </a:r>
           </a:p>
           <a:p>
@@ -32962,20 +33718,6 @@
             <a:r>
               <a:rPr lang="en-US" sz="1700" b="1" dirty="0"/>
               <a:t>Next Steps</a:t>
-            </a:r>
-          </a:p>
-          <a:p>
-            <a:pPr>
-              <a:buFont typeface="Wingdings" panose="05000000000000000000" pitchFamily="2" charset="2"/>
-              <a:buChar char="Ø"/>
-            </a:pPr>
-            <a:r>
-              <a:rPr lang="en-US" sz="1700" b="1" dirty="0">
-                <a:solidFill>
-                  <a:srgbClr val="FF0000"/>
-                </a:solidFill>
-              </a:rPr>
-              <a:t>Validate implementation at IETF 120 hackathon.</a:t>
             </a:r>
           </a:p>
           <a:p>
@@ -33027,8 +33769,230 @@
           <a:lstStyle/>
           <a:p>
             <a:fld id="{FC4AC485-25DE-431E-B345-9C0A15BB7F8A}" type="slidenum">
+              <a:rPr lang="de-CH" sz="1400" smtClean="0"/>
+              <a:t>21</a:t>
+            </a:fld>
+            <a:endParaRPr lang="de-CH" sz="1400" dirty="0"/>
+          </a:p>
+        </p:txBody>
+      </p:sp>
+    </p:spTree>
+    <p:extLst>
+      <p:ext uri="{BB962C8B-B14F-4D97-AF65-F5344CB8AC3E}">
+        <p14:creationId xmlns:p14="http://schemas.microsoft.com/office/powerpoint/2010/main" val="22946092"/>
+      </p:ext>
+    </p:extLst>
+  </p:cSld>
+  <p:clrMapOvr>
+    <a:masterClrMapping/>
+  </p:clrMapOvr>
+</p:sld>
+</file>
+
+<file path=ppt/slides/slide22.xml><?xml version="1.0" encoding="utf-8"?>
+<p:sld xmlns:a="http://schemas.openxmlformats.org/drawingml/2006/main" xmlns:r="http://schemas.openxmlformats.org/officeDocument/2006/relationships" xmlns:p="http://schemas.openxmlformats.org/presentationml/2006/main">
+  <p:cSld>
+    <p:spTree>
+      <p:nvGrpSpPr>
+        <p:cNvPr id="1" name=""/>
+        <p:cNvGrpSpPr/>
+        <p:nvPr/>
+      </p:nvGrpSpPr>
+      <p:grpSpPr>
+        <a:xfrm>
+          <a:off x="0" y="0"/>
+          <a:ext cx="0" cy="0"/>
+          <a:chOff x="0" y="0"/>
+          <a:chExt cx="0" cy="0"/>
+        </a:xfrm>
+      </p:grpSpPr>
+      <p:sp>
+        <p:nvSpPr>
+          <p:cNvPr id="2" name="Title 1">
+            <a:extLst>
+              <a:ext uri="{FF2B5EF4-FFF2-40B4-BE49-F238E27FC236}">
+                <a16:creationId xmlns:a16="http://schemas.microsoft.com/office/drawing/2014/main" id="{FF20F271-6F0D-4AC0-BB1D-F5C338165C13}"/>
+              </a:ext>
+            </a:extLst>
+          </p:cNvPr>
+          <p:cNvSpPr>
+            <a:spLocks noGrp="1"/>
+          </p:cNvSpPr>
+          <p:nvPr>
+            <p:ph type="title"/>
+          </p:nvPr>
+        </p:nvSpPr>
+        <p:spPr/>
+        <p:txBody>
+          <a:bodyPr>
+            <a:normAutofit/>
+          </a:bodyPr>
+          <a:lstStyle/>
+          <a:p>
+            <a:r>
+              <a:rPr lang="en-US" sz="2800" b="1" dirty="0"/>
+              <a:t>Support of </a:t>
+            </a:r>
+            <a:r>
+              <a:rPr lang="en-US" sz="2800" b="1" dirty="0">
+                <a:solidFill>
+                  <a:srgbClr val="FF0000"/>
+                </a:solidFill>
+              </a:rPr>
+              <a:t>Versioning</a:t>
+            </a:r>
+            <a:r>
+              <a:rPr lang="en-US" sz="2800" b="1" dirty="0"/>
+              <a:t> in YANG Notifications Subscription</a:t>
+            </a:r>
+            <a:br>
+              <a:rPr lang="en-US" sz="3200" dirty="0"/>
+            </a:br>
+            <a:r>
+              <a:rPr lang="en-US" sz="2400" dirty="0">
+                <a:solidFill>
+                  <a:schemeClr val="bg2">
+                    <a:lumMod val="75000"/>
+                  </a:schemeClr>
+                </a:solidFill>
+              </a:rPr>
+              <a:t>draft-ietf-netconf-yang-notifications-versioning-04  - Status and Next Steps</a:t>
+            </a:r>
+            <a:endParaRPr lang="en-US" sz="3100" dirty="0">
+              <a:solidFill>
+                <a:schemeClr val="bg2">
+                  <a:lumMod val="75000"/>
+                </a:schemeClr>
+              </a:solidFill>
+            </a:endParaRPr>
+          </a:p>
+        </p:txBody>
+      </p:sp>
+      <p:sp>
+        <p:nvSpPr>
+          <p:cNvPr id="3" name="Content Placeholder 2">
+            <a:extLst>
+              <a:ext uri="{FF2B5EF4-FFF2-40B4-BE49-F238E27FC236}">
+                <a16:creationId xmlns:a16="http://schemas.microsoft.com/office/drawing/2014/main" id="{29C0DFD4-432D-4B0C-93DF-790441DCF5B9}"/>
+              </a:ext>
+            </a:extLst>
+          </p:cNvPr>
+          <p:cNvSpPr>
+            <a:spLocks noGrp="1"/>
+          </p:cNvSpPr>
+          <p:nvPr>
+            <p:ph idx="1"/>
+          </p:nvPr>
+        </p:nvSpPr>
+        <p:spPr>
+          <a:xfrm>
+            <a:off x="838199" y="1810138"/>
+            <a:ext cx="10515599" cy="4441371"/>
+          </a:xfrm>
+        </p:spPr>
+        <p:txBody>
+          <a:bodyPr>
+            <a:noAutofit/>
+          </a:bodyPr>
+          <a:lstStyle/>
+          <a:p>
+            <a:pPr marL="0" indent="0">
+              <a:buNone/>
+            </a:pPr>
+            <a:r>
+              <a:rPr lang="en-US" sz="1700" b="1" dirty="0"/>
+              <a:t>Current Status</a:t>
+            </a:r>
+          </a:p>
+          <a:p>
+            <a:r>
+              <a:rPr lang="en-US" sz="1700" dirty="0"/>
+              <a:t>Resolved issue that within a "case" statement identifiers need to be unique. </a:t>
+            </a:r>
+          </a:p>
+          <a:p>
+            <a:r>
+              <a:rPr lang="en-US" sz="1700" dirty="0"/>
+              <a:t>Thanks to Jérémie Leska from 6Wind for reporting this issue.</a:t>
+            </a:r>
+          </a:p>
+          <a:p>
+            <a:pPr marL="0" indent="0">
+              <a:spcBef>
+                <a:spcPts val="1800"/>
+              </a:spcBef>
+              <a:buNone/>
+            </a:pPr>
+            <a:r>
+              <a:rPr lang="en-US" sz="1700" b="1" dirty="0"/>
+              <a:t>Next Steps</a:t>
+            </a:r>
+          </a:p>
+          <a:p>
+            <a:pPr>
+              <a:buFont typeface="Wingdings" panose="05000000000000000000" pitchFamily="2" charset="2"/>
+              <a:buChar char="Ø"/>
+            </a:pPr>
+            <a:r>
+              <a:rPr lang="en-US" sz="1700" b="1" dirty="0">
+                <a:solidFill>
+                  <a:srgbClr val="FF0000"/>
+                </a:solidFill>
+              </a:rPr>
+              <a:t>Validate implementation at IETF 120 hackathon.</a:t>
+            </a:r>
+          </a:p>
+          <a:p>
+            <a:pPr>
+              <a:buFont typeface="Wingdings" panose="05000000000000000000" pitchFamily="2" charset="2"/>
+              <a:buChar char="Ø"/>
+            </a:pPr>
+            <a:r>
+              <a:rPr lang="en-US" sz="1700" b="1" dirty="0">
+                <a:solidFill>
+                  <a:srgbClr val="FF0000"/>
+                </a:solidFill>
+              </a:rPr>
+              <a:t>Requesting feedback from the netconf working group and YANG-Push implementers.</a:t>
+            </a:r>
+            <a:endParaRPr lang="en-US" sz="1800" dirty="0">
+              <a:solidFill>
+                <a:srgbClr val="FF0000"/>
+              </a:solidFill>
+              <a:ea typeface="Times New Roman" panose="02020603050405020304" pitchFamily="18" charset="0"/>
+            </a:endParaRPr>
+          </a:p>
+        </p:txBody>
+      </p:sp>
+      <p:sp>
+        <p:nvSpPr>
+          <p:cNvPr id="7" name="Slide Number Placeholder 1">
+            <a:extLst>
+              <a:ext uri="{FF2B5EF4-FFF2-40B4-BE49-F238E27FC236}">
+                <a16:creationId xmlns:a16="http://schemas.microsoft.com/office/drawing/2014/main" id="{431654D8-5CEC-4B8C-A548-2C0DECDF0A19}"/>
+              </a:ext>
+            </a:extLst>
+          </p:cNvPr>
+          <p:cNvSpPr>
+            <a:spLocks noGrp="1"/>
+          </p:cNvSpPr>
+          <p:nvPr>
+            <p:ph type="sldNum" sz="quarter" idx="12"/>
+          </p:nvPr>
+        </p:nvSpPr>
+        <p:spPr>
+          <a:xfrm>
+            <a:off x="11587892" y="6361637"/>
+            <a:ext cx="414251" cy="365125"/>
+          </a:xfrm>
+        </p:spPr>
+        <p:txBody>
+          <a:bodyPr/>
+          <a:lstStyle/>
+          <a:p>
+            <a:fld id="{FC4AC485-25DE-431E-B345-9C0A15BB7F8A}" type="slidenum">
               <a:rPr lang="en-US" sz="1400" smtClean="0"/>
-              <a:t>21</a:t>
+              <a:t>22</a:t>
             </a:fld>
             <a:endParaRPr lang="en-US" sz="1400" dirty="0"/>
           </a:p>
@@ -36734,7 +37698,7 @@
                   <a:srgbClr val="FF0000"/>
                 </a:solidFill>
               </a:rPr>
-              <a:t>Changes in -05: </a:t>
+              <a:t>Changes in -06: </a:t>
             </a:r>
             <a:r>
               <a:rPr lang="en-US" sz="1700" dirty="0"/>

</xml_diff>